<commit_message>
Revisão, Ajustes e Ordenação dos slides
</commit_message>
<xml_diff>
--- a/StartIdea/StartIdea.Docs/Apresentacao.pptx
+++ b/StartIdea/StartIdea.Docs/Apresentacao.pptx
@@ -5,7 +5,7 @@
     <p:sldMasterId id="2147483738" r:id="rId2"/>
   </p:sldMasterIdLst>
   <p:notesMasterIdLst>
-    <p:notesMasterId r:id="rId44"/>
+    <p:notesMasterId r:id="rId43"/>
   </p:notesMasterIdLst>
   <p:sldIdLst>
     <p:sldId id="256" r:id="rId3"/>
@@ -15,14 +15,14 @@
     <p:sldId id="312" r:id="rId7"/>
     <p:sldId id="315" r:id="rId8"/>
     <p:sldId id="313" r:id="rId9"/>
-    <p:sldId id="314" r:id="rId10"/>
-    <p:sldId id="305" r:id="rId11"/>
-    <p:sldId id="307" r:id="rId12"/>
-    <p:sldId id="269" r:id="rId13"/>
-    <p:sldId id="308" r:id="rId14"/>
-    <p:sldId id="316" r:id="rId15"/>
-    <p:sldId id="310" r:id="rId16"/>
-    <p:sldId id="311" r:id="rId17"/>
+    <p:sldId id="269" r:id="rId10"/>
+    <p:sldId id="308" r:id="rId11"/>
+    <p:sldId id="316" r:id="rId12"/>
+    <p:sldId id="311" r:id="rId13"/>
+    <p:sldId id="310" r:id="rId14"/>
+    <p:sldId id="314" r:id="rId15"/>
+    <p:sldId id="305" r:id="rId16"/>
+    <p:sldId id="307" r:id="rId17"/>
     <p:sldId id="306" r:id="rId18"/>
     <p:sldId id="303" r:id="rId19"/>
     <p:sldId id="300" r:id="rId20"/>
@@ -47,8 +47,7 @@
     <p:sldId id="296" r:id="rId39"/>
     <p:sldId id="286" r:id="rId40"/>
     <p:sldId id="317" r:id="rId41"/>
-    <p:sldId id="318" r:id="rId42"/>
-    <p:sldId id="299" r:id="rId43"/>
+    <p:sldId id="299" r:id="rId42"/>
   </p:sldIdLst>
   <p:sldSz cx="9144000" cy="6858000" type="screen4x3"/>
   <p:notesSz cx="6858000" cy="9144000"/>
@@ -4214,45 +4213,50 @@
       </p:grpSpPr>
       <p:sp>
         <p:nvSpPr>
-          <p:cNvPr id="3" name="Título 2"/>
+          <p:cNvPr id="2" name="Título 1"/>
           <p:cNvSpPr>
             <a:spLocks noGrp="1"/>
           </p:cNvSpPr>
           <p:nvPr>
             <p:ph type="title"/>
-          </p:nvPr>
-        </p:nvSpPr>
-        <p:spPr/>
-        <p:txBody>
-          <a:bodyPr/>
-          <a:lstStyle/>
-          <a:p>
-            <a:r>
-              <a:rPr lang="pt-BR" dirty="0"/>
-              <a:t>Manifesto ágil</a:t>
-            </a:r>
-          </a:p>
-        </p:txBody>
-      </p:sp>
-      <p:sp>
-        <p:nvSpPr>
-          <p:cNvPr id="2" name="Espaço Reservado para Conteúdo 1"/>
-          <p:cNvSpPr>
-            <a:spLocks noGrp="1"/>
-          </p:cNvSpPr>
-          <p:nvPr>
-            <p:ph idx="1"/>
           </p:nvPr>
         </p:nvSpPr>
         <p:spPr>
           <a:xfrm>
-            <a:off x="507206" y="1993393"/>
-            <a:ext cx="8065294" cy="2947775"/>
+            <a:off x="492919" y="499533"/>
+            <a:ext cx="8079581" cy="1057259"/>
           </a:xfrm>
         </p:spPr>
         <p:txBody>
+          <a:bodyPr/>
+          <a:lstStyle/>
+          <a:p>
+            <a:r>
+              <a:rPr lang="pt-BR" dirty="0"/>
+              <a:t>Startup – Tipos de Investimento</a:t>
+            </a:r>
+          </a:p>
+        </p:txBody>
+      </p:sp>
+      <p:sp>
+        <p:nvSpPr>
+          <p:cNvPr id="3" name="Espaço Reservado para Conteúdo 2"/>
+          <p:cNvSpPr>
+            <a:spLocks noGrp="1"/>
+          </p:cNvSpPr>
+          <p:nvPr>
+            <p:ph idx="1"/>
+          </p:nvPr>
+        </p:nvSpPr>
+        <p:spPr>
+          <a:xfrm>
+            <a:off x="507206" y="1556793"/>
+            <a:ext cx="8065294" cy="4824536"/>
+          </a:xfrm>
+        </p:spPr>
+        <p:txBody>
           <a:bodyPr>
-            <a:normAutofit/>
+            <a:normAutofit lnSpcReduction="10000"/>
           </a:bodyPr>
           <a:lstStyle/>
           <a:p>
@@ -4261,68 +4265,90 @@
               <a:buChar char="ü"/>
             </a:pPr>
             <a:r>
-              <a:rPr lang="pt-BR" b="1" dirty="0"/>
-              <a:t>Indivíduos e interação entre eles</a:t>
-            </a:r>
-            <a:r>
-              <a:rPr lang="pt-BR" dirty="0"/>
-              <a:t> mais que processos e ferramentas</a:t>
-            </a:r>
-          </a:p>
-          <a:p>
-            <a:pPr>
-              <a:buFont typeface="Wingdings" panose="05000000000000000000" pitchFamily="2" charset="2"/>
-              <a:buChar char="ü"/>
-            </a:pPr>
-            <a:r>
-              <a:rPr lang="pt-BR" b="1" dirty="0"/>
-              <a:t>Software em funcionamento</a:t>
-            </a:r>
-            <a:r>
-              <a:rPr lang="pt-BR" dirty="0"/>
-              <a:t> mais que documentação abrangente</a:t>
-            </a:r>
-          </a:p>
-          <a:p>
-            <a:pPr>
-              <a:buFont typeface="Wingdings" panose="05000000000000000000" pitchFamily="2" charset="2"/>
-              <a:buChar char="ü"/>
-            </a:pPr>
-            <a:r>
-              <a:rPr lang="pt-BR" b="1" dirty="0"/>
-              <a:t>Colaboração com o cliente</a:t>
-            </a:r>
-            <a:r>
-              <a:rPr lang="pt-BR" dirty="0"/>
-              <a:t> mais que negociação de contratos</a:t>
-            </a:r>
-          </a:p>
-          <a:p>
-            <a:pPr>
-              <a:buFont typeface="Wingdings" panose="05000000000000000000" pitchFamily="2" charset="2"/>
-              <a:buChar char="ü"/>
-            </a:pPr>
-            <a:r>
-              <a:rPr lang="pt-BR" b="1" dirty="0"/>
-              <a:t>Responder a mudanças</a:t>
-            </a:r>
-            <a:r>
-              <a:rPr lang="pt-BR" dirty="0"/>
-              <a:t> mais que seguir um plano</a:t>
-            </a:r>
-          </a:p>
-          <a:p>
-            <a:pPr marL="0" indent="0">
-              <a:buNone/>
-            </a:pPr>
-            <a:endParaRPr lang="pt-BR" dirty="0"/>
+              <a:rPr lang="pt-BR" dirty="0" err="1"/>
+              <a:t>Bootstrapping</a:t>
+            </a:r>
+            <a:r>
+              <a:rPr lang="pt-BR" dirty="0"/>
+              <a:t>;</a:t>
+            </a:r>
+          </a:p>
+          <a:p>
+            <a:pPr lvl="2">
+              <a:buFont typeface="Wingdings" panose="05000000000000000000" pitchFamily="2" charset="2"/>
+              <a:buChar char="ü"/>
+            </a:pPr>
+            <a:r>
+              <a:rPr lang="pt-BR" dirty="0"/>
+              <a:t>Criar sua startup usando somente recursos próprios e não recorrendo a investidores externos.</a:t>
+            </a:r>
+          </a:p>
+          <a:p>
+            <a:pPr>
+              <a:buFont typeface="Wingdings" panose="05000000000000000000" pitchFamily="2" charset="2"/>
+              <a:buChar char="ü"/>
+            </a:pPr>
+            <a:r>
+              <a:rPr lang="pt-BR" dirty="0"/>
+              <a:t>Investimento-Anjo;</a:t>
+            </a:r>
+          </a:p>
+          <a:p>
+            <a:pPr lvl="2">
+              <a:buFont typeface="Wingdings" panose="05000000000000000000" pitchFamily="2" charset="2"/>
+              <a:buChar char="ü"/>
+            </a:pPr>
+            <a:r>
+              <a:rPr lang="pt-BR" dirty="0"/>
+              <a:t>O investidor recebe, por seu investimento, uma participação societária minoritária no negócio, e não assume posição executiva na empresa, mas atua como um conselheiro.</a:t>
+            </a:r>
+          </a:p>
+          <a:p>
+            <a:pPr>
+              <a:buFont typeface="Wingdings" panose="05000000000000000000" pitchFamily="2" charset="2"/>
+              <a:buChar char="ü"/>
+            </a:pPr>
+            <a:r>
+              <a:rPr lang="pt-BR" dirty="0"/>
+              <a:t>Capital semente;</a:t>
+            </a:r>
+          </a:p>
+          <a:p>
+            <a:pPr lvl="2">
+              <a:buFont typeface="Wingdings" panose="05000000000000000000" pitchFamily="2" charset="2"/>
+              <a:buChar char="ü"/>
+            </a:pPr>
+            <a:r>
+              <a:rPr lang="pt-BR" dirty="0"/>
+              <a:t>É um modelo de financiamento dirigido a projetos empresariais em estágio inicial ou estágio zero, em fase de projeto e desenvolvimento, antes da instalação do negócio.</a:t>
+            </a:r>
+          </a:p>
+          <a:p>
+            <a:pPr>
+              <a:buFont typeface="Wingdings" panose="05000000000000000000" pitchFamily="2" charset="2"/>
+              <a:buChar char="ü"/>
+            </a:pPr>
+            <a:r>
+              <a:rPr lang="pt-BR" dirty="0"/>
+              <a:t>Incubadoras.</a:t>
+            </a:r>
+          </a:p>
+          <a:p>
+            <a:pPr lvl="2">
+              <a:buFont typeface="Wingdings" panose="05000000000000000000" pitchFamily="2" charset="2"/>
+              <a:buChar char="ü"/>
+            </a:pPr>
+            <a:r>
+              <a:rPr lang="pt-BR" dirty="0"/>
+              <a:t>Elas oferecem suporte técnico, gerencial e formação complementar ao empreendedor e facilitam o processo de inovação e acesso a novas tecnologias nos pequenos negócios.</a:t>
+            </a:r>
           </a:p>
         </p:txBody>
       </p:sp>
     </p:spTree>
     <p:extLst>
       <p:ext uri="{BB962C8B-B14F-4D97-AF65-F5344CB8AC3E}">
-        <p14:creationId xmlns:p14="http://schemas.microsoft.com/office/powerpoint/2010/main" val="2305154754"/>
+        <p14:creationId xmlns:p14="http://schemas.microsoft.com/office/powerpoint/2010/main" val="2244996834"/>
       </p:ext>
     </p:extLst>
   </p:cSld>
@@ -4351,7 +4377,7 @@
       </p:grpSpPr>
       <p:sp>
         <p:nvSpPr>
-          <p:cNvPr id="3" name="Título 2"/>
+          <p:cNvPr id="2" name="Título 1"/>
           <p:cNvSpPr>
             <a:spLocks noGrp="1"/>
           </p:cNvSpPr>
@@ -4366,14 +4392,14 @@
           <a:p>
             <a:r>
               <a:rPr lang="pt-BR" dirty="0"/>
-              <a:t>Startup</a:t>
-            </a:r>
-          </a:p>
-        </p:txBody>
-      </p:sp>
-      <p:sp>
-        <p:nvSpPr>
-          <p:cNvPr id="2" name="Espaço Reservado para Conteúdo 1"/>
+              <a:t>Startup Enxuta</a:t>
+            </a:r>
+          </a:p>
+        </p:txBody>
+      </p:sp>
+      <p:sp>
+        <p:nvSpPr>
+          <p:cNvPr id="3" name="Espaço Reservado para Conteúdo 2"/>
           <p:cNvSpPr>
             <a:spLocks noGrp="1"/>
           </p:cNvSpPr>
@@ -4383,38 +4409,16 @@
         </p:nvSpPr>
         <p:spPr/>
         <p:txBody>
-          <a:bodyPr>
-            <a:normAutofit/>
-          </a:bodyPr>
-          <a:lstStyle/>
-          <a:p>
-            <a:pPr>
-              <a:buFont typeface="Wingdings" panose="05000000000000000000" pitchFamily="2" charset="2"/>
-              <a:buChar char="ü"/>
-            </a:pPr>
-            <a:r>
-              <a:rPr lang="pt-BR" dirty="0"/>
-              <a:t>Ato de começar algo, normalmente relacionado com companhias e empresas que estão no início de suas atividades e que buscam explorar atividades inovadoras no mercado.</a:t>
-            </a:r>
-          </a:p>
-          <a:p>
-            <a:pPr>
-              <a:buFont typeface="Wingdings" panose="05000000000000000000" pitchFamily="2" charset="2"/>
-              <a:buChar char="ü"/>
-            </a:pPr>
-            <a:r>
-              <a:rPr lang="pt-BR" dirty="0"/>
-              <a:t>Uma instituição humana projetada para criar novos produtos e serviços sob condições de extrema incerteza</a:t>
-            </a:r>
-          </a:p>
-          <a:p>
-            <a:pPr>
-              <a:buFont typeface="Wingdings" panose="05000000000000000000" pitchFamily="2" charset="2"/>
-              <a:buChar char="ü"/>
-            </a:pPr>
-            <a:r>
-              <a:rPr lang="pt-BR" dirty="0"/>
-              <a:t>Principais Características:</a:t>
+          <a:bodyPr/>
+          <a:lstStyle/>
+          <a:p>
+            <a:pPr>
+              <a:buFont typeface="Wingdings" panose="05000000000000000000" pitchFamily="2" charset="2"/>
+              <a:buChar char="ü"/>
+            </a:pPr>
+            <a:r>
+              <a:rPr lang="pt-BR" dirty="0"/>
+              <a:t>Fazer experimentos lançando "produto mínimo viável“</a:t>
             </a:r>
           </a:p>
           <a:p>
@@ -4424,45 +4428,31 @@
             </a:pPr>
             <a:r>
               <a:rPr lang="pt-BR" dirty="0"/>
-              <a:t>Inovação </a:t>
-            </a:r>
-          </a:p>
-          <a:p>
-            <a:pPr lvl="2">
-              <a:buFont typeface="Wingdings" panose="05000000000000000000" pitchFamily="2" charset="2"/>
-              <a:buChar char="ü"/>
-            </a:pPr>
-            <a:r>
-              <a:rPr lang="pt-BR" dirty="0"/>
-              <a:t>Escalabilidade </a:t>
-            </a:r>
-          </a:p>
-          <a:p>
-            <a:pPr lvl="2">
-              <a:buFont typeface="Wingdings" panose="05000000000000000000" pitchFamily="2" charset="2"/>
-              <a:buChar char="ü"/>
-            </a:pPr>
-            <a:r>
-              <a:rPr lang="pt-BR" dirty="0"/>
-              <a:t>Ter potencial para atingir grandes mercados</a:t>
-            </a:r>
-          </a:p>
-          <a:p>
-            <a:pPr lvl="2">
-              <a:buFont typeface="Wingdings" panose="05000000000000000000" pitchFamily="2" charset="2"/>
-              <a:buChar char="ü"/>
-            </a:pPr>
-            <a:r>
-              <a:rPr lang="pt-BR" dirty="0"/>
-              <a:t>Ser enxuta e flexível</a:t>
-            </a:r>
+              <a:t>Confirmação que os clientes pagariam para ter o produto</a:t>
+            </a:r>
+          </a:p>
+          <a:p>
+            <a:pPr>
+              <a:buFont typeface="Wingdings" panose="05000000000000000000" pitchFamily="2" charset="2"/>
+              <a:buChar char="ü"/>
+            </a:pPr>
+            <a:r>
+              <a:rPr lang="pt-BR" dirty="0"/>
+              <a:t>O objetivo é chegar ao conceito certo do produto, identificar quem são os clientes dispostos a pagar por ele</a:t>
+            </a:r>
+          </a:p>
+          <a:p>
+            <a:pPr marL="0" indent="0">
+              <a:buNone/>
+            </a:pPr>
+            <a:endParaRPr lang="pt-BR" dirty="0"/>
           </a:p>
         </p:txBody>
       </p:sp>
     </p:spTree>
     <p:extLst>
       <p:ext uri="{BB962C8B-B14F-4D97-AF65-F5344CB8AC3E}">
-        <p14:creationId xmlns:p14="http://schemas.microsoft.com/office/powerpoint/2010/main" val="2030121317"/>
+        <p14:creationId xmlns:p14="http://schemas.microsoft.com/office/powerpoint/2010/main" val="589983116"/>
       </p:ext>
     </p:extLst>
   </p:cSld>
@@ -4499,19 +4489,14 @@
             <p:ph type="title"/>
           </p:nvPr>
         </p:nvSpPr>
-        <p:spPr>
-          <a:xfrm>
-            <a:off x="492919" y="499533"/>
-            <a:ext cx="8079581" cy="1201276"/>
-          </a:xfrm>
-        </p:spPr>
-        <p:txBody>
-          <a:bodyPr/>
-          <a:lstStyle/>
-          <a:p>
-            <a:r>
-              <a:rPr lang="pt-BR" dirty="0"/>
-              <a:t>Startup</a:t>
+        <p:spPr/>
+        <p:txBody>
+          <a:bodyPr/>
+          <a:lstStyle/>
+          <a:p>
+            <a:r>
+              <a:rPr lang="pt-BR" dirty="0"/>
+              <a:t>Startups de sucesso</a:t>
             </a:r>
           </a:p>
         </p:txBody>
@@ -4526,80 +4511,70 @@
             <p:ph idx="1"/>
           </p:nvPr>
         </p:nvSpPr>
-        <p:spPr>
-          <a:xfrm>
-            <a:off x="507206" y="1556792"/>
-            <a:ext cx="8065294" cy="4202787"/>
-          </a:xfrm>
-        </p:spPr>
-        <p:txBody>
-          <a:bodyPr/>
-          <a:lstStyle/>
-          <a:p>
-            <a:pPr>
-              <a:buFont typeface="Wingdings" panose="05000000000000000000" pitchFamily="2" charset="2"/>
-              <a:buChar char="ü"/>
-            </a:pPr>
-            <a:r>
-              <a:rPr lang="pt-BR" dirty="0"/>
-              <a:t>Não dispõe de muitos recursos para investimento</a:t>
-            </a:r>
-          </a:p>
-          <a:p>
-            <a:pPr>
-              <a:buFont typeface="Wingdings" panose="05000000000000000000" pitchFamily="2" charset="2"/>
-              <a:buChar char="ü"/>
-            </a:pPr>
-            <a:r>
-              <a:rPr lang="pt-BR" dirty="0"/>
-              <a:t>O acesso a investimentos é um dos principais obstáculos das startups</a:t>
-            </a:r>
-          </a:p>
-          <a:p>
-            <a:pPr>
-              <a:buFont typeface="Wingdings" panose="05000000000000000000" pitchFamily="2" charset="2"/>
-              <a:buChar char="ü"/>
-            </a:pPr>
+        <p:spPr/>
+        <p:txBody>
+          <a:bodyPr/>
+          <a:lstStyle/>
+          <a:p>
+            <a:pPr>
+              <a:buFont typeface="Wingdings" panose="05000000000000000000" pitchFamily="2" charset="2"/>
+              <a:buChar char="ü"/>
+            </a:pPr>
+            <a:r>
+              <a:rPr lang="pt-BR" dirty="0" err="1"/>
+              <a:t>NuBank</a:t>
+            </a:r>
             <a:endParaRPr lang="pt-BR" dirty="0"/>
           </a:p>
-        </p:txBody>
-      </p:sp>
-      <p:pic>
-        <p:nvPicPr>
-          <p:cNvPr id="4" name="Imagem 3"/>
-          <p:cNvPicPr/>
-          <p:nvPr/>
-        </p:nvPicPr>
-        <p:blipFill>
-          <a:blip r:embed="rId2" cstate="print">
-            <a:extLst>
-              <a:ext uri="{28A0092B-C50C-407E-A947-70E740481C1C}">
-                <a14:useLocalDpi xmlns:a14="http://schemas.microsoft.com/office/drawing/2010/main" val="0"/>
-              </a:ext>
-            </a:extLst>
-          </a:blip>
-          <a:stretch>
-            <a:fillRect/>
-          </a:stretch>
-        </p:blipFill>
-        <p:spPr>
-          <a:xfrm>
-            <a:off x="1907704" y="2420888"/>
-            <a:ext cx="6664796" cy="4032448"/>
-          </a:xfrm>
-          <a:prstGeom prst="rect">
-            <a:avLst/>
-          </a:prstGeom>
-          <a:noFill/>
-          <a:ln>
-            <a:noFill/>
-          </a:ln>
-        </p:spPr>
-      </p:pic>
+          <a:p>
+            <a:pPr>
+              <a:buFont typeface="Wingdings" panose="05000000000000000000" pitchFamily="2" charset="2"/>
+              <a:buChar char="ü"/>
+            </a:pPr>
+            <a:r>
+              <a:rPr lang="pt-BR" dirty="0"/>
+              <a:t>Uber</a:t>
+            </a:r>
+          </a:p>
+          <a:p>
+            <a:pPr>
+              <a:buFont typeface="Wingdings" panose="05000000000000000000" pitchFamily="2" charset="2"/>
+              <a:buChar char="ü"/>
+            </a:pPr>
+            <a:r>
+              <a:rPr lang="pt-BR" dirty="0" err="1"/>
+              <a:t>PayPal</a:t>
+            </a:r>
+            <a:endParaRPr lang="pt-BR" dirty="0"/>
+          </a:p>
+          <a:p>
+            <a:pPr>
+              <a:buFont typeface="Wingdings" panose="05000000000000000000" pitchFamily="2" charset="2"/>
+              <a:buChar char="ü"/>
+            </a:pPr>
+            <a:r>
+              <a:rPr lang="pt-BR" dirty="0" err="1"/>
+              <a:t>Airbnb</a:t>
+            </a:r>
+            <a:endParaRPr lang="pt-BR" dirty="0"/>
+          </a:p>
+          <a:p>
+            <a:pPr>
+              <a:buFont typeface="Wingdings" panose="05000000000000000000" pitchFamily="2" charset="2"/>
+              <a:buChar char="ü"/>
+            </a:pPr>
+            <a:r>
+              <a:rPr lang="pt-BR" dirty="0" err="1"/>
+              <a:t>LinkedIn</a:t>
+            </a:r>
+            <a:endParaRPr lang="pt-BR" dirty="0"/>
+          </a:p>
+        </p:txBody>
+      </p:sp>
     </p:spTree>
     <p:extLst>
       <p:ext uri="{BB962C8B-B14F-4D97-AF65-F5344CB8AC3E}">
-        <p14:creationId xmlns:p14="http://schemas.microsoft.com/office/powerpoint/2010/main" val="3569771386"/>
+        <p14:creationId xmlns:p14="http://schemas.microsoft.com/office/powerpoint/2010/main" val="2117739404"/>
       </p:ext>
     </p:extLst>
   </p:cSld>
@@ -4639,7 +4614,7 @@
         <p:spPr>
           <a:xfrm>
             <a:off x="492919" y="499533"/>
-            <a:ext cx="8079581" cy="1057259"/>
+            <a:ext cx="8079581" cy="1493860"/>
           </a:xfrm>
         </p:spPr>
         <p:txBody>
@@ -4648,7 +4623,7 @@
           <a:p>
             <a:r>
               <a:rPr lang="pt-BR" dirty="0"/>
-              <a:t>Startup</a:t>
+              <a:t>Desenvolvimento Ágil</a:t>
             </a:r>
           </a:p>
         </p:txBody>
@@ -4665,106 +4640,79 @@
         </p:nvSpPr>
         <p:spPr>
           <a:xfrm>
-            <a:off x="507206" y="1556793"/>
-            <a:ext cx="8065294" cy="4824536"/>
+            <a:off x="507206" y="1844825"/>
+            <a:ext cx="8065294" cy="3914754"/>
           </a:xfrm>
         </p:spPr>
         <p:txBody>
-          <a:bodyPr>
-            <a:normAutofit lnSpcReduction="10000"/>
-          </a:bodyPr>
-          <a:lstStyle/>
-          <a:p>
-            <a:pPr>
-              <a:buFont typeface="Wingdings" panose="05000000000000000000" pitchFamily="2" charset="2"/>
-              <a:buChar char="ü"/>
-            </a:pPr>
-            <a:r>
-              <a:rPr lang="pt-BR" dirty="0" err="1"/>
-              <a:t>Bootstrapping</a:t>
-            </a:r>
-            <a:r>
-              <a:rPr lang="pt-BR" dirty="0"/>
-              <a:t>;</a:t>
-            </a:r>
-          </a:p>
-          <a:p>
-            <a:pPr lvl="2">
-              <a:buFont typeface="Wingdings" panose="05000000000000000000" pitchFamily="2" charset="2"/>
-              <a:buChar char="ü"/>
-            </a:pPr>
-            <a:r>
-              <a:rPr lang="pt-BR" dirty="0"/>
-              <a:t>Criar sua startup usando somente recursos próprios e não recorrendo a investidores externos.</a:t>
-            </a:r>
-          </a:p>
-          <a:p>
-            <a:pPr>
-              <a:buFont typeface="Wingdings" panose="05000000000000000000" pitchFamily="2" charset="2"/>
-              <a:buChar char="ü"/>
-            </a:pPr>
-            <a:r>
-              <a:rPr lang="pt-BR" dirty="0"/>
-              <a:t>Investimento-Anjo;</a:t>
-            </a:r>
-          </a:p>
-          <a:p>
-            <a:pPr lvl="2">
-              <a:buFont typeface="Wingdings" panose="05000000000000000000" pitchFamily="2" charset="2"/>
-              <a:buChar char="ü"/>
-            </a:pPr>
-            <a:r>
-              <a:rPr lang="pt-BR" dirty="0"/>
-              <a:t>O investidor recebe, por seu investimento, uma participação societária minoritária no negócio, e não assume posição executiva na empresa, mas atua como um conselheiro.</a:t>
-            </a:r>
-          </a:p>
-          <a:p>
-            <a:pPr>
-              <a:buFont typeface="Wingdings" panose="05000000000000000000" pitchFamily="2" charset="2"/>
-              <a:buChar char="ü"/>
-            </a:pPr>
-            <a:r>
-              <a:rPr lang="pt-BR" dirty="0"/>
-              <a:t>Capital semente;</a:t>
-            </a:r>
-          </a:p>
-          <a:p>
-            <a:pPr lvl="2">
-              <a:buFont typeface="Wingdings" panose="05000000000000000000" pitchFamily="2" charset="2"/>
-              <a:buChar char="ü"/>
-            </a:pPr>
-            <a:r>
-              <a:rPr lang="pt-BR" dirty="0"/>
-              <a:t>É um modelo de financiamento dirigido a projetos empresariais em estágio inicial ou estágio zero, em fase de projeto e desenvolvimento, antes da instalação do negócio.</a:t>
-            </a:r>
-          </a:p>
-          <a:p>
-            <a:pPr>
-              <a:buFont typeface="Wingdings" panose="05000000000000000000" pitchFamily="2" charset="2"/>
-              <a:buChar char="ü"/>
-            </a:pPr>
-            <a:r>
-              <a:rPr lang="pt-BR" dirty="0"/>
-              <a:t>Incubadoras.</a:t>
-            </a:r>
-          </a:p>
-          <a:p>
-            <a:pPr lvl="2">
-              <a:buFont typeface="Wingdings" panose="05000000000000000000" pitchFamily="2" charset="2"/>
-              <a:buChar char="ü"/>
-            </a:pPr>
-            <a:r>
-              <a:rPr lang="pt-BR" dirty="0"/>
-              <a:t>Elas oferecem suporte técnico, gerencial e formação complementar ao empreendedor e facilitam o processo de inovação e acesso a novas tecnologias nos pequenos negócios.</a:t>
-            </a:r>
+          <a:bodyPr/>
+          <a:lstStyle/>
+          <a:p>
+            <a:pPr>
+              <a:buFont typeface="Wingdings" panose="05000000000000000000" pitchFamily="2" charset="2"/>
+              <a:buChar char="ü"/>
+            </a:pPr>
+            <a:r>
+              <a:rPr lang="pt-BR" dirty="0"/>
+              <a:t>Surgiu com a necessidade de introduzir no mercado produtos com mais rapidez e níveis elevados de satisfação;</a:t>
+            </a:r>
+          </a:p>
+          <a:p>
+            <a:pPr>
+              <a:buFont typeface="Wingdings" panose="05000000000000000000" pitchFamily="2" charset="2"/>
+              <a:buChar char="ü"/>
+            </a:pPr>
+            <a:r>
+              <a:rPr lang="pt-BR" dirty="0"/>
+              <a:t>Divide o problema em produtos menores e que visa entregar software funcionando regularmente;</a:t>
+            </a:r>
+          </a:p>
+          <a:p>
+            <a:pPr>
+              <a:buFont typeface="Wingdings" panose="05000000000000000000" pitchFamily="2" charset="2"/>
+              <a:buChar char="ü"/>
+            </a:pPr>
+            <a:r>
+              <a:rPr lang="pt-BR" dirty="0"/>
+              <a:t>Não existe nenhuma necessidade especificar detalhadamente tudo que ocorrerá durante a implementação do sistema.</a:t>
+            </a:r>
+          </a:p>
+          <a:p>
+            <a:pPr marL="0" indent="0">
+              <a:buNone/>
+            </a:pPr>
             <a:endParaRPr lang="pt-BR" dirty="0"/>
           </a:p>
         </p:txBody>
       </p:sp>
+      <p:pic>
+        <p:nvPicPr>
+          <p:cNvPr id="4" name="Imagem 3"/>
+          <p:cNvPicPr>
+            <a:picLocks noChangeAspect="1"/>
+          </p:cNvPicPr>
+          <p:nvPr/>
+        </p:nvPicPr>
+        <p:blipFill>
+          <a:blip r:embed="rId2"/>
+          <a:stretch>
+            <a:fillRect/>
+          </a:stretch>
+        </p:blipFill>
+        <p:spPr>
+          <a:xfrm>
+            <a:off x="3131840" y="4365104"/>
+            <a:ext cx="3165749" cy="1823103"/>
+          </a:xfrm>
+          <a:prstGeom prst="rect">
+            <a:avLst/>
+          </a:prstGeom>
+        </p:spPr>
+      </p:pic>
     </p:spTree>
     <p:extLst>
       <p:ext uri="{BB962C8B-B14F-4D97-AF65-F5344CB8AC3E}">
-        <p14:creationId xmlns:p14="http://schemas.microsoft.com/office/powerpoint/2010/main" val="2244996834"/>
+        <p14:creationId xmlns:p14="http://schemas.microsoft.com/office/powerpoint/2010/main" val="3076839744"/>
       </p:ext>
     </p:extLst>
   </p:cSld>
@@ -4793,7 +4741,7 @@
       </p:grpSpPr>
       <p:sp>
         <p:nvSpPr>
-          <p:cNvPr id="2" name="Título 1"/>
+          <p:cNvPr id="3" name="Título 2"/>
           <p:cNvSpPr>
             <a:spLocks noGrp="1"/>
           </p:cNvSpPr>
@@ -4808,14 +4756,14 @@
           <a:p>
             <a:r>
               <a:rPr lang="pt-BR" dirty="0"/>
-              <a:t>Startups de sucesso</a:t>
-            </a:r>
-          </a:p>
-        </p:txBody>
-      </p:sp>
-      <p:sp>
-        <p:nvSpPr>
-          <p:cNvPr id="3" name="Espaço Reservado para Conteúdo 2"/>
+              <a:t>Manifesto ágil</a:t>
+            </a:r>
+          </a:p>
+        </p:txBody>
+      </p:sp>
+      <p:sp>
+        <p:nvSpPr>
+          <p:cNvPr id="2" name="Espaço Reservado para Conteúdo 1"/>
           <p:cNvSpPr>
             <a:spLocks noGrp="1"/>
           </p:cNvSpPr>
@@ -4823,68 +4771,213 @@
             <p:ph idx="1"/>
           </p:nvPr>
         </p:nvSpPr>
-        <p:spPr/>
-        <p:txBody>
-          <a:bodyPr/>
-          <a:lstStyle/>
-          <a:p>
-            <a:pPr>
-              <a:buFont typeface="Wingdings" panose="05000000000000000000" pitchFamily="2" charset="2"/>
-              <a:buChar char="ü"/>
-            </a:pPr>
+        <p:spPr>
+          <a:xfrm>
+            <a:off x="507206" y="1993393"/>
+            <a:ext cx="8065294" cy="4171911"/>
+          </a:xfrm>
+        </p:spPr>
+        <p:txBody>
+          <a:bodyPr>
+            <a:normAutofit/>
+          </a:bodyPr>
+          <a:lstStyle/>
+          <a:p>
+            <a:pPr>
+              <a:buFont typeface="Wingdings" panose="05000000000000000000" pitchFamily="2" charset="2"/>
+              <a:buChar char="ü"/>
+            </a:pPr>
+            <a:r>
+              <a:rPr lang="pt-BR" dirty="0"/>
+              <a:t>Uma declaração de princípios que fundamentam o desenvolvimento ágil de softwares;</a:t>
+            </a:r>
+          </a:p>
+          <a:p>
+            <a:pPr>
+              <a:buFont typeface="Wingdings" panose="05000000000000000000" pitchFamily="2" charset="2"/>
+              <a:buChar char="ü"/>
+            </a:pPr>
+            <a:r>
+              <a:rPr lang="pt-BR" dirty="0"/>
+              <a:t>Criado Em fevereiro de 2001, em reunião onde compareceram os 17 criadores iniciais;</a:t>
+            </a:r>
+          </a:p>
+          <a:p>
+            <a:pPr>
+              <a:buFont typeface="Wingdings" panose="05000000000000000000" pitchFamily="2" charset="2"/>
+              <a:buChar char="ü"/>
+            </a:pPr>
+            <a:r>
+              <a:rPr lang="pt-BR" dirty="0"/>
+              <a:t>Criadores: Kent Beck, Mike </a:t>
+            </a:r>
             <a:r>
               <a:rPr lang="pt-BR" dirty="0" err="1"/>
-              <a:t>NuBank</a:t>
+              <a:t>Beedle</a:t>
+            </a:r>
+            <a:r>
+              <a:rPr lang="pt-BR" dirty="0"/>
+              <a:t>, Arie van </a:t>
+            </a:r>
+            <a:r>
+              <a:rPr lang="pt-BR" dirty="0" err="1"/>
+              <a:t>Bennekum</a:t>
+            </a:r>
+            <a:r>
+              <a:rPr lang="pt-BR" dirty="0"/>
+              <a:t>, </a:t>
+            </a:r>
+            <a:r>
+              <a:rPr lang="pt-BR" dirty="0" err="1"/>
+              <a:t>Alistair</a:t>
+            </a:r>
+            <a:r>
+              <a:rPr lang="pt-BR" dirty="0"/>
+              <a:t> Cockburn, Ward Cunningham, Martin Fowler, James </a:t>
+            </a:r>
+            <a:r>
+              <a:rPr lang="pt-BR" dirty="0" err="1"/>
+              <a:t>Grenning</a:t>
+            </a:r>
+            <a:r>
+              <a:rPr lang="pt-BR" dirty="0"/>
+              <a:t>, Jim </a:t>
+            </a:r>
+            <a:r>
+              <a:rPr lang="pt-BR" dirty="0" err="1"/>
+              <a:t>Highsmith</a:t>
+            </a:r>
+            <a:r>
+              <a:rPr lang="pt-BR" dirty="0"/>
+              <a:t>, Andrew Hunt, Ron </a:t>
+            </a:r>
+            <a:r>
+              <a:rPr lang="pt-BR" dirty="0" err="1"/>
+              <a:t>Jeffries</a:t>
+            </a:r>
+            <a:r>
+              <a:rPr lang="pt-BR" dirty="0"/>
+              <a:t>, Jon </a:t>
+            </a:r>
+            <a:r>
+              <a:rPr lang="pt-BR" dirty="0" err="1"/>
+              <a:t>Kern</a:t>
+            </a:r>
+            <a:r>
+              <a:rPr lang="pt-BR" dirty="0"/>
+              <a:t>, Brian </a:t>
+            </a:r>
+            <a:r>
+              <a:rPr lang="pt-BR" dirty="0" err="1"/>
+              <a:t>Marick</a:t>
+            </a:r>
+            <a:r>
+              <a:rPr lang="pt-BR" dirty="0"/>
+              <a:t>, Robert C. Martin, Steve </a:t>
+            </a:r>
+            <a:r>
+              <a:rPr lang="pt-BR" dirty="0" err="1"/>
+              <a:t>Mellor</a:t>
+            </a:r>
+            <a:r>
+              <a:rPr lang="pt-BR" dirty="0"/>
+              <a:t>, </a:t>
+            </a:r>
+            <a:r>
+              <a:rPr lang="pt-BR" b="1" dirty="0"/>
+              <a:t>Ken </a:t>
+            </a:r>
+            <a:r>
+              <a:rPr lang="pt-BR" b="1" dirty="0" err="1"/>
+              <a:t>Schwaber</a:t>
+            </a:r>
+            <a:r>
+              <a:rPr lang="pt-BR" b="1" dirty="0"/>
+              <a:t>, Jeff Sutherland</a:t>
+            </a:r>
+            <a:r>
+              <a:rPr lang="pt-BR" dirty="0"/>
+              <a:t> e Dave Thomas;</a:t>
+            </a:r>
+          </a:p>
+          <a:p>
+            <a:pPr>
+              <a:buFont typeface="Wingdings" panose="05000000000000000000" pitchFamily="2" charset="2"/>
+              <a:buChar char="ü"/>
+            </a:pPr>
+            <a:r>
+              <a:rPr lang="en-US" dirty="0"/>
+              <a:t> </a:t>
+            </a:r>
+            <a:r>
+              <a:rPr lang="en-US" dirty="0" err="1"/>
+              <a:t>Criado</a:t>
+            </a:r>
+            <a:r>
+              <a:rPr lang="en-US" dirty="0"/>
+              <a:t> com o </a:t>
+            </a:r>
+            <a:r>
+              <a:rPr lang="en-US" dirty="0" err="1"/>
+              <a:t>objetivo</a:t>
+            </a:r>
+            <a:r>
+              <a:rPr lang="en-US" dirty="0"/>
+              <a:t> de </a:t>
+            </a:r>
+            <a:r>
+              <a:rPr lang="en-US" dirty="0" err="1"/>
+              <a:t>estabelecer</a:t>
+            </a:r>
+            <a:r>
+              <a:rPr lang="en-US" dirty="0"/>
+              <a:t> </a:t>
+            </a:r>
+            <a:r>
+              <a:rPr lang="en-US" dirty="0" err="1"/>
+              <a:t>parâmetros</a:t>
+            </a:r>
+            <a:r>
+              <a:rPr lang="en-US" dirty="0"/>
+              <a:t> para </a:t>
+            </a:r>
+            <a:r>
+              <a:rPr lang="en-US" dirty="0" err="1"/>
+              <a:t>criação</a:t>
+            </a:r>
+            <a:r>
+              <a:rPr lang="en-US" dirty="0"/>
+              <a:t> de </a:t>
+            </a:r>
+            <a:r>
+              <a:rPr lang="en-US" dirty="0" err="1"/>
+              <a:t>metodologias</a:t>
+            </a:r>
+            <a:r>
+              <a:rPr lang="en-US" dirty="0"/>
+              <a:t> </a:t>
+            </a:r>
+            <a:r>
+              <a:rPr lang="en-US" dirty="0" err="1"/>
+              <a:t>ágeis</a:t>
+            </a:r>
+            <a:r>
+              <a:rPr lang="en-US" dirty="0"/>
+              <a:t> para </a:t>
+            </a:r>
+            <a:r>
+              <a:rPr lang="en-US" dirty="0" err="1"/>
+              <a:t>desenvolvimento</a:t>
+            </a:r>
+            <a:r>
+              <a:rPr lang="en-US" dirty="0"/>
+              <a:t> de software.</a:t>
             </a:r>
             <a:endParaRPr lang="pt-BR" dirty="0"/>
           </a:p>
           <a:p>
-            <a:pPr>
-              <a:buFont typeface="Wingdings" panose="05000000000000000000" pitchFamily="2" charset="2"/>
-              <a:buChar char="ü"/>
-            </a:pPr>
-            <a:r>
-              <a:rPr lang="pt-BR" dirty="0"/>
-              <a:t>Uber</a:t>
-            </a:r>
-          </a:p>
-          <a:p>
-            <a:pPr>
-              <a:buFont typeface="Wingdings" panose="05000000000000000000" pitchFamily="2" charset="2"/>
-              <a:buChar char="ü"/>
-            </a:pPr>
-            <a:r>
-              <a:rPr lang="pt-BR" dirty="0" err="1"/>
-              <a:t>PayPal</a:t>
-            </a:r>
-            <a:endParaRPr lang="pt-BR" dirty="0"/>
-          </a:p>
-          <a:p>
-            <a:pPr>
-              <a:buFont typeface="Wingdings" panose="05000000000000000000" pitchFamily="2" charset="2"/>
-              <a:buChar char="ü"/>
-            </a:pPr>
-            <a:r>
-              <a:rPr lang="pt-BR" dirty="0" err="1"/>
-              <a:t>Airbnb</a:t>
-            </a:r>
-            <a:endParaRPr lang="pt-BR" dirty="0"/>
-          </a:p>
-          <a:p>
-            <a:pPr>
-              <a:buFont typeface="Wingdings" panose="05000000000000000000" pitchFamily="2" charset="2"/>
-              <a:buChar char="ü"/>
-            </a:pPr>
-            <a:r>
-              <a:rPr lang="pt-BR" dirty="0" err="1"/>
-              <a:t>LinkedIn</a:t>
-            </a:r>
-            <a:endParaRPr lang="pt-BR" dirty="0"/>
-          </a:p>
-          <a:p>
-            <a:pPr>
-              <a:buFont typeface="Wingdings" panose="05000000000000000000" pitchFamily="2" charset="2"/>
-              <a:buChar char="ü"/>
+            <a:pPr marL="0" indent="0">
+              <a:buNone/>
             </a:pPr>
             <a:endParaRPr lang="pt-BR" dirty="0"/>
           </a:p>
@@ -4893,7 +4986,7 @@
     </p:spTree>
     <p:extLst>
       <p:ext uri="{BB962C8B-B14F-4D97-AF65-F5344CB8AC3E}">
-        <p14:creationId xmlns:p14="http://schemas.microsoft.com/office/powerpoint/2010/main" val="2117739404"/>
+        <p14:creationId xmlns:p14="http://schemas.microsoft.com/office/powerpoint/2010/main" val="1665822349"/>
       </p:ext>
     </p:extLst>
   </p:cSld>
@@ -4922,7 +5015,7 @@
       </p:grpSpPr>
       <p:sp>
         <p:nvSpPr>
-          <p:cNvPr id="2" name="Título 1"/>
+          <p:cNvPr id="3" name="Título 2"/>
           <p:cNvSpPr>
             <a:spLocks noGrp="1"/>
           </p:cNvSpPr>
@@ -4937,14 +5030,14 @@
           <a:p>
             <a:r>
               <a:rPr lang="pt-BR" dirty="0"/>
-              <a:t>Startup Enxuta</a:t>
-            </a:r>
-          </a:p>
-        </p:txBody>
-      </p:sp>
-      <p:sp>
-        <p:nvSpPr>
-          <p:cNvPr id="3" name="Espaço Reservado para Conteúdo 2"/>
+              <a:t>Manifesto ágil - Princípios</a:t>
+            </a:r>
+          </a:p>
+        </p:txBody>
+      </p:sp>
+      <p:sp>
+        <p:nvSpPr>
+          <p:cNvPr id="2" name="Espaço Reservado para Conteúdo 1"/>
           <p:cNvSpPr>
             <a:spLocks noGrp="1"/>
           </p:cNvSpPr>
@@ -4952,38 +5045,71 @@
             <p:ph idx="1"/>
           </p:nvPr>
         </p:nvSpPr>
-        <p:spPr/>
-        <p:txBody>
-          <a:bodyPr/>
-          <a:lstStyle/>
-          <a:p>
-            <a:pPr>
-              <a:buFont typeface="Wingdings" panose="05000000000000000000" pitchFamily="2" charset="2"/>
-              <a:buChar char="ü"/>
-            </a:pPr>
-            <a:r>
-              <a:rPr lang="pt-BR" dirty="0"/>
-              <a:t>Fazer experimentos lançando "produto mínimo viável“</a:t>
-            </a:r>
-          </a:p>
-          <a:p>
-            <a:pPr lvl="2">
-              <a:buFont typeface="Wingdings" panose="05000000000000000000" pitchFamily="2" charset="2"/>
-              <a:buChar char="ü"/>
-            </a:pPr>
-            <a:r>
-              <a:rPr lang="pt-BR" dirty="0"/>
-              <a:t>Confirmação que os clientes pagariam para ter o produto</a:t>
-            </a:r>
-          </a:p>
-          <a:p>
-            <a:pPr>
-              <a:buFont typeface="Wingdings" panose="05000000000000000000" pitchFamily="2" charset="2"/>
-              <a:buChar char="ü"/>
-            </a:pPr>
-            <a:r>
-              <a:rPr lang="pt-BR" dirty="0"/>
-              <a:t>O objetivo é chegar ao conceito certo do produto, identificar quem são os clientes dispostos a pagar por ele</a:t>
+        <p:spPr>
+          <a:xfrm>
+            <a:off x="507206" y="1993393"/>
+            <a:ext cx="8065294" cy="2947775"/>
+          </a:xfrm>
+        </p:spPr>
+        <p:txBody>
+          <a:bodyPr>
+            <a:normAutofit/>
+          </a:bodyPr>
+          <a:lstStyle/>
+          <a:p>
+            <a:pPr>
+              <a:buFont typeface="Wingdings" panose="05000000000000000000" pitchFamily="2" charset="2"/>
+              <a:buChar char="ü"/>
+            </a:pPr>
+            <a:r>
+              <a:rPr lang="pt-BR" b="1" dirty="0"/>
+              <a:t>Indivíduos e interação entre eles</a:t>
+            </a:r>
+            <a:r>
+              <a:rPr lang="pt-BR" dirty="0"/>
+              <a:t> mais que processos e ferramentas</a:t>
+            </a:r>
+          </a:p>
+          <a:p>
+            <a:pPr>
+              <a:buFont typeface="Wingdings" panose="05000000000000000000" pitchFamily="2" charset="2"/>
+              <a:buChar char="ü"/>
+            </a:pPr>
+            <a:r>
+              <a:rPr lang="pt-BR" b="1" dirty="0"/>
+              <a:t>Software em funcionamento</a:t>
+            </a:r>
+            <a:r>
+              <a:rPr lang="pt-BR" dirty="0"/>
+              <a:t> mais que documentação abrangente</a:t>
+            </a:r>
+          </a:p>
+          <a:p>
+            <a:pPr>
+              <a:buFont typeface="Wingdings" panose="05000000000000000000" pitchFamily="2" charset="2"/>
+              <a:buChar char="ü"/>
+            </a:pPr>
+            <a:r>
+              <a:rPr lang="pt-BR" b="1" dirty="0"/>
+              <a:t>Colaboração com o cliente</a:t>
+            </a:r>
+            <a:r>
+              <a:rPr lang="pt-BR" dirty="0"/>
+              <a:t> mais que negociação de contratos</a:t>
+            </a:r>
+          </a:p>
+          <a:p>
+            <a:pPr>
+              <a:buFont typeface="Wingdings" panose="05000000000000000000" pitchFamily="2" charset="2"/>
+              <a:buChar char="ü"/>
+            </a:pPr>
+            <a:r>
+              <a:rPr lang="pt-BR" b="1" dirty="0"/>
+              <a:t>Responder a mudanças</a:t>
+            </a:r>
+            <a:r>
+              <a:rPr lang="pt-BR" dirty="0"/>
+              <a:t> mais que seguir um plano</a:t>
             </a:r>
           </a:p>
           <a:p>
@@ -4997,7 +5123,7 @@
     </p:spTree>
     <p:extLst>
       <p:ext uri="{BB962C8B-B14F-4D97-AF65-F5344CB8AC3E}">
-        <p14:creationId xmlns:p14="http://schemas.microsoft.com/office/powerpoint/2010/main" val="589983116"/>
+        <p14:creationId xmlns:p14="http://schemas.microsoft.com/office/powerpoint/2010/main" val="2305154754"/>
       </p:ext>
     </p:extLst>
   </p:cSld>
@@ -7870,7 +7996,7 @@
           <a:p>
             <a:r>
               <a:rPr lang="pt-BR" dirty="0"/>
-              <a:t>Adesão ao </a:t>
+              <a:t>Empresas que utilizam o </a:t>
             </a:r>
             <a:r>
               <a:rPr lang="pt-BR" dirty="0" err="1"/>
@@ -7892,10 +8018,91 @@
         </p:nvSpPr>
         <p:spPr/>
         <p:txBody>
-          <a:bodyPr/>
-          <a:lstStyle/>
-          <a:p>
-            <a:endParaRPr lang="pt-BR"/>
+          <a:bodyPr numCol="2"/>
+          <a:lstStyle/>
+          <a:p>
+            <a:pPr>
+              <a:buFont typeface="Wingdings" panose="05000000000000000000" pitchFamily="2" charset="2"/>
+              <a:buChar char="ü"/>
+            </a:pPr>
+            <a:r>
+              <a:rPr lang="pt-BR" dirty="0"/>
+              <a:t>Google</a:t>
+            </a:r>
+          </a:p>
+          <a:p>
+            <a:pPr>
+              <a:buFont typeface="Wingdings" panose="05000000000000000000" pitchFamily="2" charset="2"/>
+              <a:buChar char="ü"/>
+            </a:pPr>
+            <a:r>
+              <a:rPr lang="pt-BR" dirty="0"/>
+              <a:t>Bosch</a:t>
+            </a:r>
+          </a:p>
+          <a:p>
+            <a:pPr>
+              <a:buFont typeface="Wingdings" panose="05000000000000000000" pitchFamily="2" charset="2"/>
+              <a:buChar char="ü"/>
+            </a:pPr>
+            <a:r>
+              <a:rPr lang="pt-BR" dirty="0"/>
+              <a:t>Globo</a:t>
+            </a:r>
+          </a:p>
+          <a:p>
+            <a:pPr>
+              <a:buFont typeface="Wingdings" panose="05000000000000000000" pitchFamily="2" charset="2"/>
+              <a:buChar char="ü"/>
+            </a:pPr>
+            <a:r>
+              <a:rPr lang="pt-BR" dirty="0" err="1"/>
+              <a:t>Locaweb</a:t>
+            </a:r>
+            <a:endParaRPr lang="pt-BR" dirty="0"/>
+          </a:p>
+          <a:p>
+            <a:pPr>
+              <a:buFont typeface="Wingdings" panose="05000000000000000000" pitchFamily="2" charset="2"/>
+              <a:buChar char="ü"/>
+            </a:pPr>
+            <a:r>
+              <a:rPr lang="pt-BR" dirty="0"/>
+              <a:t>Abril</a:t>
+            </a:r>
+          </a:p>
+          <a:p>
+            <a:pPr>
+              <a:buFont typeface="Wingdings" panose="05000000000000000000" pitchFamily="2" charset="2"/>
+              <a:buChar char="ü"/>
+            </a:pPr>
+            <a:r>
+              <a:rPr lang="pt-BR" dirty="0" err="1"/>
+              <a:t>Caelum</a:t>
+            </a:r>
+            <a:endParaRPr lang="pt-BR" dirty="0"/>
+          </a:p>
+          <a:p>
+            <a:pPr>
+              <a:buFont typeface="Wingdings" panose="05000000000000000000" pitchFamily="2" charset="2"/>
+              <a:buChar char="ü"/>
+            </a:pPr>
+            <a:r>
+              <a:rPr lang="pt-BR" dirty="0"/>
+              <a:t>DB1 Informática</a:t>
+            </a:r>
+          </a:p>
+          <a:p>
+            <a:pPr marL="0" indent="0">
+              <a:buNone/>
+            </a:pPr>
+            <a:endParaRPr lang="pt-BR" dirty="0"/>
+          </a:p>
+          <a:p>
+            <a:pPr marL="0" indent="0">
+              <a:buNone/>
+            </a:pPr>
+            <a:endParaRPr lang="pt-BR" dirty="0"/>
           </a:p>
         </p:txBody>
       </p:sp>
@@ -8024,82 +8231,6 @@
 </file>
 
 <file path=ppt/slides/slide40.xml><?xml version="1.0" encoding="utf-8"?>
-<p:sld xmlns:a="http://schemas.openxmlformats.org/drawingml/2006/main" xmlns:r="http://schemas.openxmlformats.org/officeDocument/2006/relationships" xmlns:p="http://schemas.openxmlformats.org/presentationml/2006/main">
-  <p:cSld>
-    <p:spTree>
-      <p:nvGrpSpPr>
-        <p:cNvPr id="1" name=""/>
-        <p:cNvGrpSpPr/>
-        <p:nvPr/>
-      </p:nvGrpSpPr>
-      <p:grpSpPr>
-        <a:xfrm>
-          <a:off x="0" y="0"/>
-          <a:ext cx="0" cy="0"/>
-          <a:chOff x="0" y="0"/>
-          <a:chExt cx="0" cy="0"/>
-        </a:xfrm>
-      </p:grpSpPr>
-      <p:sp>
-        <p:nvSpPr>
-          <p:cNvPr id="2" name="Título 1"/>
-          <p:cNvSpPr>
-            <a:spLocks noGrp="1"/>
-          </p:cNvSpPr>
-          <p:nvPr>
-            <p:ph type="title"/>
-          </p:nvPr>
-        </p:nvSpPr>
-        <p:spPr/>
-        <p:txBody>
-          <a:bodyPr/>
-          <a:lstStyle/>
-          <a:p>
-            <a:r>
-              <a:rPr lang="pt-BR" dirty="0"/>
-              <a:t>Certificação </a:t>
-            </a:r>
-            <a:r>
-              <a:rPr lang="pt-BR" dirty="0" err="1"/>
-              <a:t>Scrum</a:t>
-            </a:r>
-            <a:endParaRPr lang="pt-BR" dirty="0"/>
-          </a:p>
-        </p:txBody>
-      </p:sp>
-      <p:sp>
-        <p:nvSpPr>
-          <p:cNvPr id="3" name="Espaço Reservado para Conteúdo 2"/>
-          <p:cNvSpPr>
-            <a:spLocks noGrp="1"/>
-          </p:cNvSpPr>
-          <p:nvPr>
-            <p:ph idx="1"/>
-          </p:nvPr>
-        </p:nvSpPr>
-        <p:spPr/>
-        <p:txBody>
-          <a:bodyPr/>
-          <a:lstStyle/>
-          <a:p>
-            <a:endParaRPr lang="pt-BR"/>
-          </a:p>
-        </p:txBody>
-      </p:sp>
-    </p:spTree>
-    <p:extLst>
-      <p:ext uri="{BB962C8B-B14F-4D97-AF65-F5344CB8AC3E}">
-        <p14:creationId xmlns:p14="http://schemas.microsoft.com/office/powerpoint/2010/main" val="272233007"/>
-      </p:ext>
-    </p:extLst>
-  </p:cSld>
-  <p:clrMapOvr>
-    <a:masterClrMapping/>
-  </p:clrMapOvr>
-</p:sld>
-</file>
-
-<file path=ppt/slides/slide41.xml><?xml version="1.0" encoding="utf-8"?>
 <p:sld xmlns:a="http://schemas.openxmlformats.org/drawingml/2006/main" xmlns:r="http://schemas.openxmlformats.org/officeDocument/2006/relationships" xmlns:p="http://schemas.openxmlformats.org/presentationml/2006/main">
   <p:cSld>
     <p:spTree>
@@ -8481,11 +8612,7 @@
           <a:p>
             <a:r>
               <a:rPr lang="pt-BR" dirty="0"/>
-              <a:t>Slides </a:t>
-            </a:r>
-            <a:r>
-              <a:rPr lang="pt-BR" dirty="0" err="1"/>
-              <a:t>toyota</a:t>
+              <a:t>Sistema Toyota de Produção (TPS)</a:t>
             </a:r>
             <a:endParaRPr lang="pt-BR" dirty="0"/>
           </a:p>
@@ -8542,7 +8669,7 @@
       </p:grpSpPr>
       <p:sp>
         <p:nvSpPr>
-          <p:cNvPr id="2" name="Título 1"/>
+          <p:cNvPr id="3" name="Título 2"/>
           <p:cNvSpPr>
             <a:spLocks noGrp="1"/>
           </p:cNvSpPr>
@@ -8550,26 +8677,26 @@
             <p:ph type="title"/>
           </p:nvPr>
         </p:nvSpPr>
-        <p:spPr>
-          <a:xfrm>
-            <a:off x="492919" y="499533"/>
-            <a:ext cx="8079581" cy="1493860"/>
-          </a:xfrm>
-        </p:spPr>
-        <p:txBody>
-          <a:bodyPr/>
-          <a:lstStyle/>
-          <a:p>
-            <a:r>
-              <a:rPr lang="pt-BR" dirty="0"/>
-              <a:t>Desenvolvimento Ágil</a:t>
-            </a:r>
-          </a:p>
-        </p:txBody>
-      </p:sp>
-      <p:sp>
-        <p:nvSpPr>
-          <p:cNvPr id="3" name="Espaço Reservado para Conteúdo 2"/>
+        <p:spPr/>
+        <p:txBody>
+          <a:bodyPr/>
+          <a:lstStyle/>
+          <a:p>
+            <a:r>
+              <a:rPr lang="pt-BR" dirty="0"/>
+              <a:t>Definição de </a:t>
+            </a:r>
+            <a:r>
+              <a:rPr lang="pt-BR" dirty="0"/>
+              <a:t>Startup</a:t>
+            </a:r>
+            <a:endParaRPr lang="pt-BR" dirty="0"/>
+          </a:p>
+        </p:txBody>
+      </p:sp>
+      <p:sp>
+        <p:nvSpPr>
+          <p:cNvPr id="2" name="Espaço Reservado para Conteúdo 1"/>
           <p:cNvSpPr>
             <a:spLocks noGrp="1"/>
           </p:cNvSpPr>
@@ -8577,81 +8704,78 @@
             <p:ph idx="1"/>
           </p:nvPr>
         </p:nvSpPr>
-        <p:spPr>
-          <a:xfrm>
-            <a:off x="507206" y="1844825"/>
-            <a:ext cx="8065294" cy="3914754"/>
-          </a:xfrm>
-        </p:spPr>
-        <p:txBody>
-          <a:bodyPr/>
-          <a:lstStyle/>
-          <a:p>
-            <a:pPr>
-              <a:buFont typeface="Wingdings" panose="05000000000000000000" pitchFamily="2" charset="2"/>
-              <a:buChar char="ü"/>
-            </a:pPr>
-            <a:r>
-              <a:rPr lang="pt-BR" dirty="0"/>
-              <a:t>Surgiu com a necessidade de introduzir no mercado produtos com mais rapidez e níveis elevados de satisfação;</a:t>
-            </a:r>
-          </a:p>
-          <a:p>
-            <a:pPr>
-              <a:buFont typeface="Wingdings" panose="05000000000000000000" pitchFamily="2" charset="2"/>
-              <a:buChar char="ü"/>
-            </a:pPr>
-            <a:r>
-              <a:rPr lang="pt-BR" dirty="0"/>
-              <a:t>Divide o problema em produtos menores e que visa entregar software funcionando regularmente;</a:t>
-            </a:r>
-          </a:p>
-          <a:p>
-            <a:pPr>
-              <a:buFont typeface="Wingdings" panose="05000000000000000000" pitchFamily="2" charset="2"/>
-              <a:buChar char="ü"/>
-            </a:pPr>
-            <a:r>
-              <a:rPr lang="pt-BR" dirty="0"/>
-              <a:t>Não existe nenhuma necessidade especificar detalhadamente tudo que ocorrerá durante a implementação do sistema.</a:t>
-            </a:r>
-          </a:p>
-          <a:p>
-            <a:pPr marL="0" indent="0">
-              <a:buNone/>
-            </a:pPr>
-            <a:endParaRPr lang="pt-BR" dirty="0"/>
-          </a:p>
-        </p:txBody>
-      </p:sp>
-      <p:pic>
-        <p:nvPicPr>
-          <p:cNvPr id="4" name="Imagem 3"/>
-          <p:cNvPicPr>
-            <a:picLocks noChangeAspect="1"/>
-          </p:cNvPicPr>
-          <p:nvPr/>
-        </p:nvPicPr>
-        <p:blipFill>
-          <a:blip r:embed="rId2"/>
-          <a:stretch>
-            <a:fillRect/>
-          </a:stretch>
-        </p:blipFill>
-        <p:spPr>
-          <a:xfrm>
-            <a:off x="3131840" y="4365104"/>
-            <a:ext cx="3165749" cy="1823103"/>
-          </a:xfrm>
-          <a:prstGeom prst="rect">
-            <a:avLst/>
-          </a:prstGeom>
-        </p:spPr>
-      </p:pic>
+        <p:spPr/>
+        <p:txBody>
+          <a:bodyPr>
+            <a:normAutofit/>
+          </a:bodyPr>
+          <a:lstStyle/>
+          <a:p>
+            <a:pPr>
+              <a:buFont typeface="Wingdings" panose="05000000000000000000" pitchFamily="2" charset="2"/>
+              <a:buChar char="ü"/>
+            </a:pPr>
+            <a:r>
+              <a:rPr lang="pt-BR" dirty="0"/>
+              <a:t>Uma instituição humana projetada para criar novos produtos e serviços sob condições de extrema incerteza;</a:t>
+            </a:r>
+          </a:p>
+          <a:p>
+            <a:pPr>
+              <a:buFont typeface="Wingdings" panose="05000000000000000000" pitchFamily="2" charset="2"/>
+              <a:buChar char="ü"/>
+            </a:pPr>
+            <a:r>
+              <a:rPr lang="pt-BR" dirty="0"/>
+              <a:t>Principais Características:</a:t>
+            </a:r>
+          </a:p>
+          <a:p>
+            <a:pPr lvl="2">
+              <a:buFont typeface="Wingdings" panose="05000000000000000000" pitchFamily="2" charset="2"/>
+              <a:buChar char="ü"/>
+            </a:pPr>
+            <a:r>
+              <a:rPr lang="pt-BR" dirty="0"/>
+              <a:t>Inovação </a:t>
+            </a:r>
+          </a:p>
+          <a:p>
+            <a:pPr lvl="2">
+              <a:buFont typeface="Wingdings" panose="05000000000000000000" pitchFamily="2" charset="2"/>
+              <a:buChar char="ü"/>
+            </a:pPr>
+            <a:r>
+              <a:rPr lang="pt-BR" dirty="0"/>
+              <a:t>Escalabilidade </a:t>
+            </a:r>
+          </a:p>
+          <a:p>
+            <a:pPr lvl="2">
+              <a:buFont typeface="Wingdings" panose="05000000000000000000" pitchFamily="2" charset="2"/>
+              <a:buChar char="ü"/>
+            </a:pPr>
+            <a:r>
+              <a:rPr lang="pt-BR" dirty="0"/>
+              <a:t>Ter potencial para atingir grandes mercados</a:t>
+            </a:r>
+          </a:p>
+          <a:p>
+            <a:pPr lvl="2">
+              <a:buFont typeface="Wingdings" panose="05000000000000000000" pitchFamily="2" charset="2"/>
+              <a:buChar char="ü"/>
+            </a:pPr>
+            <a:r>
+              <a:rPr lang="pt-BR" dirty="0"/>
+              <a:t>Ser enxuta e flexível</a:t>
+            </a:r>
+          </a:p>
+        </p:txBody>
+      </p:sp>
     </p:spTree>
     <p:extLst>
       <p:ext uri="{BB962C8B-B14F-4D97-AF65-F5344CB8AC3E}">
-        <p14:creationId xmlns:p14="http://schemas.microsoft.com/office/powerpoint/2010/main" val="3076839744"/>
+        <p14:creationId xmlns:p14="http://schemas.microsoft.com/office/powerpoint/2010/main" val="2030121317"/>
       </p:ext>
     </p:extLst>
   </p:cSld>
@@ -8680,252 +8804,115 @@
       </p:grpSpPr>
       <p:sp>
         <p:nvSpPr>
-          <p:cNvPr id="3" name="Título 2"/>
+          <p:cNvPr id="2" name="Título 1"/>
           <p:cNvSpPr>
             <a:spLocks noGrp="1"/>
           </p:cNvSpPr>
           <p:nvPr>
             <p:ph type="title"/>
-          </p:nvPr>
-        </p:nvSpPr>
-        <p:spPr/>
-        <p:txBody>
-          <a:bodyPr/>
-          <a:lstStyle/>
-          <a:p>
-            <a:r>
-              <a:rPr lang="pt-BR" dirty="0"/>
-              <a:t>Manifesto ágil</a:t>
-            </a:r>
-          </a:p>
-        </p:txBody>
-      </p:sp>
-      <p:sp>
-        <p:nvSpPr>
-          <p:cNvPr id="2" name="Espaço Reservado para Conteúdo 1"/>
-          <p:cNvSpPr>
-            <a:spLocks noGrp="1"/>
-          </p:cNvSpPr>
-          <p:nvPr>
-            <p:ph idx="1"/>
           </p:nvPr>
         </p:nvSpPr>
         <p:spPr>
           <a:xfrm>
-            <a:off x="507206" y="1993393"/>
-            <a:ext cx="8065294" cy="4171911"/>
+            <a:off x="492919" y="499533"/>
+            <a:ext cx="8079581" cy="1201276"/>
           </a:xfrm>
         </p:spPr>
         <p:txBody>
-          <a:bodyPr>
-            <a:normAutofit/>
-          </a:bodyPr>
-          <a:lstStyle/>
-          <a:p>
-            <a:pPr>
-              <a:buFont typeface="Wingdings" panose="05000000000000000000" pitchFamily="2" charset="2"/>
-              <a:buChar char="ü"/>
-            </a:pPr>
-            <a:r>
-              <a:rPr lang="pt-BR" dirty="0"/>
-              <a:t>Uma declaração de princípios que fundamentam o desenvolvimento ágil de softwares;</a:t>
-            </a:r>
-          </a:p>
-          <a:p>
-            <a:pPr>
-              <a:buFont typeface="Wingdings" panose="05000000000000000000" pitchFamily="2" charset="2"/>
-              <a:buChar char="ü"/>
-            </a:pPr>
-            <a:r>
-              <a:rPr lang="pt-BR" dirty="0"/>
-              <a:t>Criado Em fevereiro de 2001, em reunião onde compareceram os 17 criadores iniciais;</a:t>
-            </a:r>
-          </a:p>
-          <a:p>
-            <a:pPr>
-              <a:buFont typeface="Wingdings" panose="05000000000000000000" pitchFamily="2" charset="2"/>
-              <a:buChar char="ü"/>
-            </a:pPr>
-            <a:r>
-              <a:rPr lang="pt-BR" dirty="0"/>
-              <a:t>Criadores: Kent Beck, Mike </a:t>
-            </a:r>
-            <a:r>
-              <a:rPr lang="pt-BR" dirty="0" err="1"/>
-              <a:t>Beedle</a:t>
-            </a:r>
-            <a:r>
-              <a:rPr lang="pt-BR" dirty="0"/>
-              <a:t>, Arie van </a:t>
-            </a:r>
-            <a:r>
-              <a:rPr lang="pt-BR" dirty="0" err="1"/>
-              <a:t>Bennekum</a:t>
-            </a:r>
-            <a:r>
-              <a:rPr lang="pt-BR" dirty="0"/>
-              <a:t>, </a:t>
-            </a:r>
-            <a:r>
-              <a:rPr lang="pt-BR" dirty="0" err="1"/>
-              <a:t>Alistair</a:t>
-            </a:r>
-            <a:r>
-              <a:rPr lang="pt-BR" dirty="0"/>
-              <a:t> Cockburn, Ward Cunningham, Martin Fowler, James </a:t>
-            </a:r>
-            <a:r>
-              <a:rPr lang="pt-BR" dirty="0" err="1"/>
-              <a:t>Grenning</a:t>
-            </a:r>
-            <a:r>
-              <a:rPr lang="pt-BR" dirty="0"/>
-              <a:t>, Jim </a:t>
-            </a:r>
-            <a:r>
-              <a:rPr lang="pt-BR" dirty="0" err="1"/>
-              <a:t>Highsmith</a:t>
-            </a:r>
-            <a:r>
-              <a:rPr lang="pt-BR" dirty="0"/>
-              <a:t>, Andrew Hunt, Ron </a:t>
-            </a:r>
-            <a:r>
-              <a:rPr lang="pt-BR" dirty="0" err="1"/>
-              <a:t>Jeffries</a:t>
-            </a:r>
-            <a:r>
-              <a:rPr lang="pt-BR" dirty="0"/>
-              <a:t>, Jon </a:t>
-            </a:r>
-            <a:r>
-              <a:rPr lang="pt-BR" dirty="0" err="1"/>
-              <a:t>Kern</a:t>
-            </a:r>
-            <a:r>
-              <a:rPr lang="pt-BR" dirty="0"/>
-              <a:t>, Brian </a:t>
-            </a:r>
-            <a:r>
-              <a:rPr lang="pt-BR" dirty="0" err="1"/>
-              <a:t>Marick</a:t>
-            </a:r>
-            <a:r>
-              <a:rPr lang="pt-BR" dirty="0"/>
-              <a:t>, Robert C. Martin, Steve </a:t>
-            </a:r>
-            <a:r>
-              <a:rPr lang="pt-BR" dirty="0" err="1"/>
-              <a:t>Mellor</a:t>
-            </a:r>
-            <a:r>
-              <a:rPr lang="pt-BR" dirty="0"/>
-              <a:t>, </a:t>
-            </a:r>
-            <a:r>
-              <a:rPr lang="pt-BR" b="1" dirty="0"/>
-              <a:t>Ken </a:t>
-            </a:r>
-            <a:r>
-              <a:rPr lang="pt-BR" b="1" dirty="0" err="1"/>
-              <a:t>Schwaber</a:t>
-            </a:r>
-            <a:r>
-              <a:rPr lang="pt-BR" b="1" dirty="0"/>
-              <a:t>, Jeff Sutherland</a:t>
-            </a:r>
-            <a:r>
-              <a:rPr lang="pt-BR" dirty="0"/>
-              <a:t> e Dave Thomas;</a:t>
-            </a:r>
-          </a:p>
-          <a:p>
-            <a:pPr>
-              <a:buFont typeface="Wingdings" panose="05000000000000000000" pitchFamily="2" charset="2"/>
-              <a:buChar char="ü"/>
-            </a:pPr>
-            <a:r>
-              <a:rPr lang="en-US" dirty="0"/>
-              <a:t> </a:t>
-            </a:r>
-            <a:r>
-              <a:rPr lang="en-US" dirty="0" err="1"/>
-              <a:t>Criado</a:t>
-            </a:r>
-            <a:r>
-              <a:rPr lang="en-US" dirty="0"/>
-              <a:t> com o </a:t>
-            </a:r>
-            <a:r>
-              <a:rPr lang="en-US" dirty="0" err="1"/>
-              <a:t>objetivo</a:t>
-            </a:r>
-            <a:r>
-              <a:rPr lang="en-US" dirty="0"/>
-              <a:t> de </a:t>
-            </a:r>
-            <a:r>
-              <a:rPr lang="en-US" dirty="0" err="1"/>
-              <a:t>estabelecer</a:t>
-            </a:r>
-            <a:r>
-              <a:rPr lang="en-US" dirty="0"/>
-              <a:t> </a:t>
-            </a:r>
-            <a:r>
-              <a:rPr lang="en-US" dirty="0" err="1"/>
-              <a:t>parâmetros</a:t>
-            </a:r>
-            <a:r>
-              <a:rPr lang="en-US" dirty="0"/>
-              <a:t> para </a:t>
-            </a:r>
-            <a:r>
-              <a:rPr lang="en-US" dirty="0" err="1"/>
-              <a:t>criação</a:t>
-            </a:r>
-            <a:r>
-              <a:rPr lang="en-US" dirty="0"/>
-              <a:t> de </a:t>
-            </a:r>
-            <a:r>
-              <a:rPr lang="en-US" dirty="0" err="1"/>
-              <a:t>metodologias</a:t>
-            </a:r>
-            <a:r>
-              <a:rPr lang="en-US" dirty="0"/>
-              <a:t> </a:t>
-            </a:r>
-            <a:r>
-              <a:rPr lang="en-US" dirty="0" err="1"/>
-              <a:t>ágeis</a:t>
-            </a:r>
-            <a:r>
-              <a:rPr lang="en-US" dirty="0"/>
-              <a:t> para </a:t>
-            </a:r>
-            <a:r>
-              <a:rPr lang="en-US" dirty="0" err="1"/>
-              <a:t>desenvolvimento</a:t>
-            </a:r>
-            <a:r>
-              <a:rPr lang="en-US" dirty="0"/>
-              <a:t> de software.</a:t>
-            </a:r>
+          <a:bodyPr/>
+          <a:lstStyle/>
+          <a:p>
+            <a:r>
+              <a:rPr lang="pt-BR" dirty="0"/>
+              <a:t>Startup - Recursos</a:t>
+            </a:r>
+          </a:p>
+        </p:txBody>
+      </p:sp>
+      <p:sp>
+        <p:nvSpPr>
+          <p:cNvPr id="3" name="Espaço Reservado para Conteúdo 2"/>
+          <p:cNvSpPr>
+            <a:spLocks noGrp="1"/>
+          </p:cNvSpPr>
+          <p:nvPr>
+            <p:ph idx="1"/>
+          </p:nvPr>
+        </p:nvSpPr>
+        <p:spPr>
+          <a:xfrm>
+            <a:off x="507206" y="1556792"/>
+            <a:ext cx="8065294" cy="4202787"/>
+          </a:xfrm>
+        </p:spPr>
+        <p:txBody>
+          <a:bodyPr/>
+          <a:lstStyle/>
+          <a:p>
+            <a:pPr>
+              <a:buFont typeface="Wingdings" panose="05000000000000000000" pitchFamily="2" charset="2"/>
+              <a:buChar char="ü"/>
+            </a:pPr>
+            <a:r>
+              <a:rPr lang="pt-BR" dirty="0"/>
+              <a:t>Não dispõe de muitos recursos para investimento</a:t>
+            </a:r>
+          </a:p>
+          <a:p>
+            <a:pPr>
+              <a:buFont typeface="Wingdings" panose="05000000000000000000" pitchFamily="2" charset="2"/>
+              <a:buChar char="ü"/>
+            </a:pPr>
+            <a:r>
+              <a:rPr lang="pt-BR" dirty="0"/>
+              <a:t>O acesso a investimentos é um dos principais obstáculos das startups</a:t>
+            </a:r>
+          </a:p>
+          <a:p>
+            <a:pPr>
+              <a:buFont typeface="Wingdings" panose="05000000000000000000" pitchFamily="2" charset="2"/>
+              <a:buChar char="ü"/>
+            </a:pPr>
             <a:endParaRPr lang="pt-BR" dirty="0"/>
           </a:p>
-          <a:p>
-            <a:pPr marL="0" indent="0">
-              <a:buNone/>
-            </a:pPr>
-            <a:endParaRPr lang="pt-BR" dirty="0"/>
-          </a:p>
-        </p:txBody>
-      </p:sp>
+        </p:txBody>
+      </p:sp>
+      <p:pic>
+        <p:nvPicPr>
+          <p:cNvPr id="4" name="Imagem 3"/>
+          <p:cNvPicPr/>
+          <p:nvPr/>
+        </p:nvPicPr>
+        <p:blipFill>
+          <a:blip r:embed="rId2" cstate="print">
+            <a:extLst>
+              <a:ext uri="{28A0092B-C50C-407E-A947-70E740481C1C}">
+                <a14:useLocalDpi xmlns:a14="http://schemas.microsoft.com/office/drawing/2010/main" val="0"/>
+              </a:ext>
+            </a:extLst>
+          </a:blip>
+          <a:stretch>
+            <a:fillRect/>
+          </a:stretch>
+        </p:blipFill>
+        <p:spPr>
+          <a:xfrm>
+            <a:off x="1907704" y="2420888"/>
+            <a:ext cx="6664796" cy="4032448"/>
+          </a:xfrm>
+          <a:prstGeom prst="rect">
+            <a:avLst/>
+          </a:prstGeom>
+          <a:noFill/>
+          <a:ln>
+            <a:noFill/>
+          </a:ln>
+        </p:spPr>
+      </p:pic>
     </p:spTree>
     <p:extLst>
       <p:ext uri="{BB962C8B-B14F-4D97-AF65-F5344CB8AC3E}">
-        <p14:creationId xmlns:p14="http://schemas.microsoft.com/office/powerpoint/2010/main" val="1665822349"/>
+        <p14:creationId xmlns:p14="http://schemas.microsoft.com/office/powerpoint/2010/main" val="3569771386"/>
       </p:ext>
     </p:extLst>
   </p:cSld>

</xml_diff>

<commit_message>
Conclusão (slide), Ajuste cs
</commit_message>
<xml_diff>
--- a/StartIdea/StartIdea.Docs/Apresentacao.pptx
+++ b/StartIdea/StartIdea.Docs/Apresentacao.pptx
@@ -4197,6 +4197,16 @@
               <a:t>Elton Garbin &amp; Gabriel Silva</a:t>
             </a:r>
           </a:p>
+          <a:p>
+            <a:r>
+              <a:rPr lang="en-US" i="1" dirty="0"/>
+              <a:t>Orientador</a:t>
+            </a:r>
+            <a:r>
+              <a:rPr lang="pt-BR" i="1" dirty="0"/>
+              <a:t>: Guilherme Santos</a:t>
+            </a:r>
+          </a:p>
         </p:txBody>
       </p:sp>
     </p:spTree>
@@ -4240,10 +4250,9 @@
           <a:lstStyle/>
           <a:p>
             <a:r>
-              <a:rPr lang="pt-BR" dirty="0" err="1"/>
+              <a:rPr lang="pt-BR" dirty="0"/>
               <a:t>Kaizen</a:t>
             </a:r>
-            <a:endParaRPr lang="pt-BR" dirty="0"/>
           </a:p>
         </p:txBody>
       </p:sp>
@@ -4288,15 +4297,7 @@
             </a:pPr>
             <a:r>
               <a:rPr lang="pt-BR" dirty="0"/>
-              <a:t>Na prática o </a:t>
-            </a:r>
-            <a:r>
-              <a:rPr lang="pt-BR" dirty="0" err="1"/>
-              <a:t>Kaizen</a:t>
-            </a:r>
-            <a:r>
-              <a:rPr lang="pt-BR" dirty="0"/>
-              <a:t> significa que todos os colaboradores em todas as partes da organização estão continuamente à procura de maneiras para melhorar as operações.</a:t>
+              <a:t>Na prática o Kaizen significa que todos os colaboradores em todas as partes da organização estão continuamente à procura de maneiras para melhorar as operações.</a:t>
             </a:r>
           </a:p>
           <a:p>
@@ -4525,10 +4526,9 @@
           <a:lstStyle/>
           <a:p>
             <a:r>
-              <a:rPr lang="pt-BR" dirty="0" err="1"/>
+              <a:rPr lang="pt-BR" dirty="0"/>
               <a:t>Jidoka</a:t>
             </a:r>
-            <a:endParaRPr lang="pt-BR" dirty="0"/>
           </a:p>
         </p:txBody>
       </p:sp>
@@ -4553,75 +4553,27 @@
             </a:pPr>
             <a:r>
               <a:rPr lang="pt-BR" dirty="0"/>
-              <a:t>Significa </a:t>
-            </a:r>
-            <a:r>
-              <a:rPr lang="pt-BR" dirty="0" err="1"/>
-              <a:t>autonomação</a:t>
-            </a:r>
-            <a:r>
-              <a:rPr lang="pt-BR" dirty="0"/>
-              <a:t> (automação com um toque humano);</a:t>
-            </a:r>
-          </a:p>
-          <a:p>
-            <a:pPr>
-              <a:buFont typeface="Wingdings" panose="05000000000000000000" pitchFamily="2" charset="2"/>
-              <a:buChar char="ü"/>
-            </a:pPr>
-            <a:r>
-              <a:rPr lang="pt-BR" dirty="0"/>
-              <a:t>Aplicar </a:t>
-            </a:r>
-            <a:r>
-              <a:rPr lang="pt-BR" dirty="0" err="1"/>
-              <a:t>Jidoka</a:t>
-            </a:r>
-            <a:r>
-              <a:rPr lang="pt-BR" dirty="0"/>
-              <a:t> evita que os defeitos de produção gerem retrabalhos, refugos, ou até mesmo que cheguem junto com o produto acabado às mãos do cliente;</a:t>
-            </a:r>
-          </a:p>
-          <a:p>
-            <a:pPr>
-              <a:buFont typeface="Wingdings" panose="05000000000000000000" pitchFamily="2" charset="2"/>
-              <a:buChar char="ü"/>
-            </a:pPr>
-            <a:r>
-              <a:rPr lang="pt-BR" dirty="0"/>
-              <a:t>É constituído por elementos importantes tais como: </a:t>
-            </a:r>
-            <a:r>
-              <a:rPr lang="pt-BR" dirty="0" err="1"/>
-              <a:t>Genchi</a:t>
-            </a:r>
-            <a:r>
-              <a:rPr lang="pt-BR" dirty="0"/>
-              <a:t> </a:t>
-            </a:r>
-            <a:r>
-              <a:rPr lang="pt-BR" dirty="0" err="1"/>
-              <a:t>Genbutsu</a:t>
-            </a:r>
-            <a:r>
-              <a:rPr lang="pt-BR" dirty="0"/>
-              <a:t>, Painel </a:t>
-            </a:r>
-            <a:r>
-              <a:rPr lang="pt-BR" dirty="0" err="1"/>
-              <a:t>Andon</a:t>
-            </a:r>
-            <a:r>
-              <a:rPr lang="pt-BR" dirty="0"/>
-              <a:t> e </a:t>
-            </a:r>
-            <a:r>
-              <a:rPr lang="pt-BR" dirty="0" err="1"/>
-              <a:t>Poka-Yoke</a:t>
-            </a:r>
-            <a:r>
-              <a:rPr lang="pt-BR" dirty="0"/>
-              <a:t>.</a:t>
+              <a:t>Significa autonomação (automação com um toque humano);</a:t>
+            </a:r>
+          </a:p>
+          <a:p>
+            <a:pPr>
+              <a:buFont typeface="Wingdings" panose="05000000000000000000" pitchFamily="2" charset="2"/>
+              <a:buChar char="ü"/>
+            </a:pPr>
+            <a:r>
+              <a:rPr lang="pt-BR" dirty="0"/>
+              <a:t>Aplicar Jidoka evita que os defeitos de produção gerem retrabalhos, refugos, ou até mesmo que cheguem junto com o produto acabado às mãos do cliente;</a:t>
+            </a:r>
+          </a:p>
+          <a:p>
+            <a:pPr>
+              <a:buFont typeface="Wingdings" panose="05000000000000000000" pitchFamily="2" charset="2"/>
+              <a:buChar char="ü"/>
+            </a:pPr>
+            <a:r>
+              <a:rPr lang="pt-BR" dirty="0"/>
+              <a:t>É constituído por elementos importantes tais como: Genchi Genbutsu, Painel Andon e Poka-Yoke.</a:t>
             </a:r>
           </a:p>
         </p:txBody>
@@ -4672,18 +4624,9 @@
           <a:lstStyle/>
           <a:p>
             <a:r>
-              <a:rPr lang="pt-BR" dirty="0" err="1"/>
-              <a:t>Genchi</a:t>
-            </a:r>
-            <a:r>
-              <a:rPr lang="pt-BR" dirty="0"/>
-              <a:t> </a:t>
-            </a:r>
-            <a:r>
-              <a:rPr lang="pt-BR" dirty="0" err="1"/>
-              <a:t>Genbutsu</a:t>
-            </a:r>
-            <a:endParaRPr lang="pt-BR" dirty="0"/>
+              <a:rPr lang="pt-BR" dirty="0"/>
+              <a:t>Genchi Genbutsu</a:t>
+            </a:r>
           </a:p>
         </p:txBody>
       </p:sp>
@@ -4708,31 +4651,7 @@
             </a:pPr>
             <a:r>
               <a:rPr lang="pt-BR" dirty="0"/>
-              <a:t>Expressão japonesa que significa “vai e veja você mesmo” não distante da ideia do conceito MBWA (Management </a:t>
-            </a:r>
-            <a:r>
-              <a:rPr lang="pt-BR" dirty="0" err="1"/>
-              <a:t>By</a:t>
-            </a:r>
-            <a:r>
-              <a:rPr lang="pt-BR" dirty="0"/>
-              <a:t> </a:t>
-            </a:r>
-            <a:r>
-              <a:rPr lang="pt-BR" dirty="0" err="1"/>
-              <a:t>Walking</a:t>
-            </a:r>
-            <a:r>
-              <a:rPr lang="pt-BR" dirty="0"/>
-              <a:t> </a:t>
-            </a:r>
-            <a:r>
-              <a:rPr lang="pt-BR" dirty="0" err="1"/>
-              <a:t>Around</a:t>
-            </a:r>
-            <a:r>
-              <a:rPr lang="pt-BR" dirty="0"/>
-              <a:t>);</a:t>
+              <a:t>Expressão japonesa que significa “vai e veja você mesmo” não distante da ideia do conceito MBWA (Management By Walking Around);</a:t>
             </a:r>
           </a:p>
           <a:p>
@@ -4799,13 +4718,8 @@
           <a:p>
             <a:r>
               <a:rPr lang="pt-BR" dirty="0"/>
-              <a:t>Painel </a:t>
-            </a:r>
-            <a:r>
-              <a:rPr lang="pt-BR" dirty="0" err="1"/>
-              <a:t>Andon</a:t>
-            </a:r>
-            <a:endParaRPr lang="pt-BR" dirty="0"/>
+              <a:t>Painel Andon</a:t>
+            </a:r>
           </a:p>
         </p:txBody>
       </p:sp>
@@ -4924,10 +4838,9 @@
           <a:lstStyle/>
           <a:p>
             <a:r>
-              <a:rPr lang="pt-BR" dirty="0" err="1"/>
+              <a:rPr lang="pt-BR" dirty="0"/>
               <a:t>Poka-Yoke</a:t>
             </a:r>
-            <a:endParaRPr lang="pt-BR" dirty="0"/>
           </a:p>
         </p:txBody>
       </p:sp>
@@ -5154,23 +5067,7 @@
             </a:pPr>
             <a:r>
               <a:rPr lang="pt-BR" dirty="0"/>
-              <a:t>É constituído por princípios chaves tais como: Eliminação do desperdiço (muda), </a:t>
-            </a:r>
-            <a:r>
-              <a:rPr lang="pt-BR" dirty="0" err="1"/>
-              <a:t>Takt</a:t>
-            </a:r>
-            <a:r>
-              <a:rPr lang="pt-BR" dirty="0"/>
-              <a:t> time e </a:t>
-            </a:r>
-            <a:r>
-              <a:rPr lang="pt-BR" dirty="0" err="1"/>
-              <a:t>Kanban</a:t>
-            </a:r>
-            <a:r>
-              <a:rPr lang="pt-BR" dirty="0"/>
-              <a:t>.</a:t>
+              <a:t>É constituído por princípios chaves tais como: Eliminação do desperdiço (muda), Takt time e Kanban.</a:t>
             </a:r>
           </a:p>
         </p:txBody>
@@ -5347,12 +5244,8 @@
           </a:lstStyle>
           <a:p>
             <a:r>
-              <a:rPr lang="pt-BR" dirty="0" err="1"/>
-              <a:t>Takt</a:t>
-            </a:r>
-            <a:r>
-              <a:rPr lang="pt-BR" dirty="0"/>
-              <a:t> time</a:t>
+              <a:rPr lang="pt-BR" dirty="0"/>
+              <a:t>Takt time</a:t>
             </a:r>
           </a:p>
         </p:txBody>
@@ -5576,15 +5469,7 @@
             </a:pPr>
             <a:r>
               <a:rPr lang="pt-BR" dirty="0"/>
-              <a:t>Vem da palavra alemã </a:t>
-            </a:r>
-            <a:r>
-              <a:rPr lang="pt-BR" dirty="0" err="1"/>
-              <a:t>taktzeit</a:t>
-            </a:r>
-            <a:r>
-              <a:rPr lang="pt-BR" dirty="0"/>
-              <a:t>, que pode ser traduzida como tempo de ciclo;</a:t>
+              <a:t>Vem da palavra alemã taktzeit, que pode ser traduzida como tempo de ciclo;</a:t>
             </a:r>
           </a:p>
           <a:p>
@@ -5740,10 +5625,9 @@
               <a:buChar char="ü"/>
             </a:pPr>
             <a:r>
-              <a:rPr lang="pt-BR" dirty="0" err="1"/>
+              <a:rPr lang="pt-BR" dirty="0"/>
               <a:t>Scrum</a:t>
             </a:r>
-            <a:endParaRPr lang="pt-BR" dirty="0"/>
           </a:p>
         </p:txBody>
       </p:sp>
@@ -5788,10 +5672,9 @@
           <a:lstStyle/>
           <a:p>
             <a:r>
-              <a:rPr lang="pt-BR" dirty="0" err="1"/>
+              <a:rPr lang="pt-BR" dirty="0"/>
               <a:t>Kanban</a:t>
             </a:r>
-            <a:endParaRPr lang="pt-BR" dirty="0"/>
           </a:p>
         </p:txBody>
       </p:sp>
@@ -5826,15 +5709,7 @@
             </a:pPr>
             <a:r>
               <a:rPr lang="pt-BR" dirty="0"/>
-              <a:t>Esses quadros e cartões visuais integram o sistema </a:t>
-            </a:r>
-            <a:r>
-              <a:rPr lang="pt-BR" dirty="0" err="1"/>
-              <a:t>Kanban</a:t>
-            </a:r>
-            <a:r>
-              <a:rPr lang="pt-BR" dirty="0"/>
-              <a:t>, que ajudam os trabalhadores a planejarem a produção na indústria e a controlar o estoque. Assim, conforme a quantidade de cartões disponíveis nos quadros são tomadas decisões, priorizando o que é mais importante, realizando setup de máquinas e até mesmo as paradas para manutenção</a:t>
+              <a:t>Esses quadros e cartões visuais integram o sistema Kanban, que ajudam os trabalhadores a planejarem a produção na indústria e a controlar o estoque. Assim, conforme a quantidade de cartões disponíveis nos quadros são tomadas decisões, priorizando o que é mais importante, realizando setup de máquinas e até mesmo as paradas para manutenção</a:t>
             </a:r>
           </a:p>
         </p:txBody>
@@ -6190,12 +6065,8 @@
               <a:buChar char="ü"/>
             </a:pPr>
             <a:r>
-              <a:rPr lang="pt-BR" dirty="0" err="1"/>
-              <a:t>Bootstrapping</a:t>
-            </a:r>
-            <a:r>
-              <a:rPr lang="pt-BR" dirty="0"/>
-              <a:t>;</a:t>
+              <a:rPr lang="pt-BR" dirty="0"/>
+              <a:t>Bootstrapping;</a:t>
             </a:r>
           </a:p>
           <a:p>
@@ -6446,10 +6317,9 @@
               <a:buChar char="ü"/>
             </a:pPr>
             <a:r>
-              <a:rPr lang="pt-BR" dirty="0" err="1"/>
+              <a:rPr lang="pt-BR" dirty="0"/>
               <a:t>NuBank</a:t>
             </a:r>
-            <a:endParaRPr lang="pt-BR" dirty="0"/>
           </a:p>
           <a:p>
             <a:pPr>
@@ -6467,32 +6337,29 @@
               <a:buChar char="ü"/>
             </a:pPr>
             <a:r>
-              <a:rPr lang="pt-BR" dirty="0" err="1"/>
+              <a:rPr lang="pt-BR" dirty="0"/>
               <a:t>PayPal</a:t>
             </a:r>
-            <a:endParaRPr lang="pt-BR" dirty="0"/>
-          </a:p>
-          <a:p>
-            <a:pPr>
-              <a:buFont typeface="Wingdings" panose="05000000000000000000" pitchFamily="2" charset="2"/>
-              <a:buChar char="ü"/>
-            </a:pPr>
-            <a:r>
-              <a:rPr lang="pt-BR" dirty="0" err="1"/>
+          </a:p>
+          <a:p>
+            <a:pPr>
+              <a:buFont typeface="Wingdings" panose="05000000000000000000" pitchFamily="2" charset="2"/>
+              <a:buChar char="ü"/>
+            </a:pPr>
+            <a:r>
+              <a:rPr lang="pt-BR" dirty="0"/>
               <a:t>Airbnb</a:t>
             </a:r>
-            <a:endParaRPr lang="pt-BR" dirty="0"/>
-          </a:p>
-          <a:p>
-            <a:pPr>
-              <a:buFont typeface="Wingdings" panose="05000000000000000000" pitchFamily="2" charset="2"/>
-              <a:buChar char="ü"/>
-            </a:pPr>
-            <a:r>
-              <a:rPr lang="pt-BR" dirty="0" err="1"/>
+          </a:p>
+          <a:p>
+            <a:pPr>
+              <a:buFont typeface="Wingdings" panose="05000000000000000000" pitchFamily="2" charset="2"/>
+              <a:buChar char="ü"/>
+            </a:pPr>
+            <a:r>
+              <a:rPr lang="pt-BR" dirty="0"/>
               <a:t>LinkedIn</a:t>
             </a:r>
-            <a:endParaRPr lang="pt-BR" dirty="0"/>
           </a:p>
         </p:txBody>
       </p:sp>
@@ -6734,91 +6601,11 @@
             </a:pPr>
             <a:r>
               <a:rPr lang="pt-BR" dirty="0"/>
-              <a:t>Criadores: Kent Beck, Mike </a:t>
-            </a:r>
-            <a:r>
-              <a:rPr lang="pt-BR" dirty="0" err="1"/>
-              <a:t>Beedle</a:t>
-            </a:r>
-            <a:r>
-              <a:rPr lang="pt-BR" dirty="0"/>
-              <a:t>, Arie van </a:t>
-            </a:r>
-            <a:r>
-              <a:rPr lang="pt-BR" dirty="0" err="1"/>
-              <a:t>Bennekum</a:t>
-            </a:r>
-            <a:r>
-              <a:rPr lang="pt-BR" dirty="0"/>
-              <a:t>, </a:t>
-            </a:r>
-            <a:r>
-              <a:rPr lang="pt-BR" dirty="0" err="1"/>
-              <a:t>Alistair</a:t>
-            </a:r>
-            <a:r>
-              <a:rPr lang="pt-BR" dirty="0"/>
-              <a:t> Cockburn, Ward Cunningham, Martin Fowler, James </a:t>
-            </a:r>
-            <a:r>
-              <a:rPr lang="pt-BR" dirty="0" err="1"/>
-              <a:t>Grenning</a:t>
-            </a:r>
-            <a:r>
-              <a:rPr lang="pt-BR" dirty="0"/>
-              <a:t>, Jim </a:t>
-            </a:r>
-            <a:r>
-              <a:rPr lang="pt-BR" dirty="0" err="1"/>
-              <a:t>Highsmith</a:t>
-            </a:r>
-            <a:r>
-              <a:rPr lang="pt-BR" dirty="0"/>
-              <a:t>, Andrew Hunt, Ron </a:t>
-            </a:r>
-            <a:r>
-              <a:rPr lang="pt-BR" dirty="0" err="1"/>
-              <a:t>Jeffries</a:t>
-            </a:r>
-            <a:r>
-              <a:rPr lang="pt-BR" dirty="0"/>
-              <a:t>, Jon </a:t>
-            </a:r>
-            <a:r>
-              <a:rPr lang="pt-BR" dirty="0" err="1"/>
-              <a:t>Kern</a:t>
-            </a:r>
-            <a:r>
-              <a:rPr lang="pt-BR" dirty="0"/>
-              <a:t>, Brian </a:t>
-            </a:r>
-            <a:r>
-              <a:rPr lang="pt-BR" dirty="0" err="1"/>
-              <a:t>Marick</a:t>
-            </a:r>
-            <a:r>
-              <a:rPr lang="pt-BR" dirty="0"/>
-              <a:t>, Robert C. Martin, Steve </a:t>
-            </a:r>
-            <a:r>
-              <a:rPr lang="pt-BR" dirty="0" err="1"/>
-              <a:t>Mellor</a:t>
-            </a:r>
-            <a:r>
-              <a:rPr lang="pt-BR" dirty="0"/>
-              <a:t>, </a:t>
+              <a:t>Criadores: Kent Beck, Mike Beedle, Arie van Bennekum, Alistair Cockburn, Ward Cunningham, Martin Fowler, James Grenning, Jim Highsmith, Andrew Hunt, Ron Jeffries, Jon Kern, Brian Marick, Robert C. Martin, Steve Mellor, </a:t>
             </a:r>
             <a:r>
               <a:rPr lang="pt-BR" b="1" dirty="0"/>
-              <a:t>Ken </a:t>
-            </a:r>
-            <a:r>
-              <a:rPr lang="pt-BR" b="1" dirty="0" err="1"/>
-              <a:t>Schwaber</a:t>
-            </a:r>
-            <a:r>
-              <a:rPr lang="pt-BR" b="1" dirty="0"/>
-              <a:t>, Jeff Sutherland</a:t>
+              <a:t>Ken Schwaber, Jeff Sutherland</a:t>
             </a:r>
             <a:r>
               <a:rPr lang="pt-BR" dirty="0"/>
@@ -6832,71 +6619,7 @@
             </a:pPr>
             <a:r>
               <a:rPr lang="en-US" dirty="0"/>
-              <a:t> </a:t>
-            </a:r>
-            <a:r>
-              <a:rPr lang="en-US" dirty="0" err="1"/>
-              <a:t>Criado</a:t>
-            </a:r>
-            <a:r>
-              <a:rPr lang="en-US" dirty="0"/>
-              <a:t> com o </a:t>
-            </a:r>
-            <a:r>
-              <a:rPr lang="en-US" dirty="0" err="1"/>
-              <a:t>objetivo</a:t>
-            </a:r>
-            <a:r>
-              <a:rPr lang="en-US" dirty="0"/>
-              <a:t> de </a:t>
-            </a:r>
-            <a:r>
-              <a:rPr lang="en-US" dirty="0" err="1"/>
-              <a:t>estabelecer</a:t>
-            </a:r>
-            <a:r>
-              <a:rPr lang="en-US" dirty="0"/>
-              <a:t> </a:t>
-            </a:r>
-            <a:r>
-              <a:rPr lang="en-US" dirty="0" err="1"/>
-              <a:t>parâmetros</a:t>
-            </a:r>
-            <a:r>
-              <a:rPr lang="en-US" dirty="0"/>
-              <a:t> para </a:t>
-            </a:r>
-            <a:r>
-              <a:rPr lang="en-US" dirty="0" err="1"/>
-              <a:t>criação</a:t>
-            </a:r>
-            <a:r>
-              <a:rPr lang="en-US" dirty="0"/>
-              <a:t> de </a:t>
-            </a:r>
-            <a:r>
-              <a:rPr lang="en-US" dirty="0" err="1"/>
-              <a:t>metodologias</a:t>
-            </a:r>
-            <a:r>
-              <a:rPr lang="en-US" dirty="0"/>
-              <a:t> </a:t>
-            </a:r>
-            <a:r>
-              <a:rPr lang="en-US" dirty="0" err="1"/>
-              <a:t>ágeis</a:t>
-            </a:r>
-            <a:r>
-              <a:rPr lang="en-US" dirty="0"/>
-              <a:t> para </a:t>
-            </a:r>
-            <a:r>
-              <a:rPr lang="en-US" dirty="0" err="1"/>
-              <a:t>desenvolvimento</a:t>
-            </a:r>
-            <a:r>
-              <a:rPr lang="en-US" dirty="0"/>
-              <a:t> de software.</a:t>
+              <a:t> Criado com o objetivo de estabelecer parâmetros para criação de metodologias ágeis para desenvolvimento de software.</a:t>
             </a:r>
             <a:endParaRPr lang="pt-BR" dirty="0"/>
           </a:p>
@@ -7374,7 +7097,7 @@
           <a:lstStyle/>
           <a:p>
             <a:r>
-              <a:rPr lang="en-US" dirty="0" err="1"/>
+              <a:rPr lang="en-US" dirty="0"/>
               <a:t>Transpar</a:t>
             </a:r>
             <a:r>
@@ -7706,39 +7429,7 @@
             </a:pPr>
             <a:r>
               <a:rPr lang="pt-BR" dirty="0"/>
-              <a:t>Baseia-se no sistema Toyota de produção desenvolvido por </a:t>
-            </a:r>
-            <a:r>
-              <a:rPr lang="pt-BR" dirty="0" err="1"/>
-              <a:t>Taiichi</a:t>
-            </a:r>
-            <a:r>
-              <a:rPr lang="pt-BR" dirty="0"/>
-              <a:t> </a:t>
-            </a:r>
-            <a:r>
-              <a:rPr lang="pt-BR" dirty="0" err="1"/>
-              <a:t>Ohno</a:t>
-            </a:r>
-            <a:r>
-              <a:rPr lang="pt-BR" dirty="0"/>
-              <a:t> e no ciclo OODA (Observe, </a:t>
-            </a:r>
-            <a:r>
-              <a:rPr lang="pt-BR" dirty="0" err="1"/>
-              <a:t>Orient</a:t>
-            </a:r>
-            <a:r>
-              <a:rPr lang="pt-BR" dirty="0"/>
-              <a:t>, Decide, </a:t>
-            </a:r>
-            <a:r>
-              <a:rPr lang="pt-BR" dirty="0" err="1"/>
-              <a:t>Act</a:t>
-            </a:r>
-            <a:r>
-              <a:rPr lang="pt-BR" dirty="0"/>
-              <a:t>) da aviação de combate.</a:t>
+              <a:t>Baseia-se no sistema Toyota de produção desenvolvido por Taiichi Ohno e no ciclo OODA (Observe, Orient, Decide, Act) da aviação de combate.</a:t>
             </a:r>
           </a:p>
         </p:txBody>
@@ -10022,13 +9713,8 @@
           <a:p>
             <a:r>
               <a:rPr lang="pt-BR" dirty="0"/>
-              <a:t>Empresas que utilizam o </a:t>
-            </a:r>
-            <a:r>
-              <a:rPr lang="pt-BR" dirty="0" err="1"/>
-              <a:t>Scrum</a:t>
-            </a:r>
-            <a:endParaRPr lang="pt-BR" dirty="0"/>
+              <a:t>Empresas que utilizam o Scrum</a:t>
+            </a:r>
           </a:p>
         </p:txBody>
       </p:sp>
@@ -10082,10 +9768,9 @@
               <a:buChar char="ü"/>
             </a:pPr>
             <a:r>
-              <a:rPr lang="pt-BR" dirty="0" err="1"/>
+              <a:rPr lang="pt-BR" dirty="0"/>
               <a:t>Locaweb</a:t>
             </a:r>
-            <a:endParaRPr lang="pt-BR" dirty="0"/>
           </a:p>
           <a:p>
             <a:pPr>
@@ -10103,10 +9788,9 @@
               <a:buChar char="ü"/>
             </a:pPr>
             <a:r>
-              <a:rPr lang="pt-BR" dirty="0" err="1"/>
+              <a:rPr lang="pt-BR" dirty="0"/>
               <a:t>Caelum</a:t>
             </a:r>
-            <a:endParaRPr lang="pt-BR" dirty="0"/>
           </a:p>
           <a:p>
             <a:pPr>
@@ -10172,7 +9856,12 @@
             <p:ph type="title"/>
           </p:nvPr>
         </p:nvSpPr>
-        <p:spPr/>
+        <p:spPr>
+          <a:xfrm>
+            <a:off x="492919" y="332657"/>
+            <a:ext cx="8079581" cy="864096"/>
+          </a:xfrm>
+        </p:spPr>
         <p:txBody>
           <a:bodyPr/>
           <a:lstStyle/>
@@ -10194,19 +9883,67 @@
             <p:ph idx="1"/>
           </p:nvPr>
         </p:nvSpPr>
-        <p:spPr/>
-        <p:txBody>
-          <a:bodyPr/>
-          <a:lstStyle/>
-          <a:p>
-            <a:pPr>
-              <a:buFont typeface="Wingdings" panose="05000000000000000000" pitchFamily="2" charset="2"/>
-              <a:buChar char="ü"/>
-            </a:pPr>
-            <a:r>
-              <a:rPr lang="pt-BR" dirty="0"/>
-              <a:t>É fundamental a utilização das metodologias ágeis de desenvolvimento de projetos em startups.</a:t>
-            </a:r>
+        <p:spPr>
+          <a:xfrm>
+            <a:off x="507206" y="1196752"/>
+            <a:ext cx="8065294" cy="5328592"/>
+          </a:xfrm>
+        </p:spPr>
+        <p:txBody>
+          <a:bodyPr>
+            <a:normAutofit lnSpcReduction="10000"/>
+          </a:bodyPr>
+          <a:lstStyle/>
+          <a:p>
+            <a:pPr>
+              <a:buFont typeface="Wingdings" panose="05000000000000000000" pitchFamily="2" charset="2"/>
+              <a:buChar char="ü"/>
+            </a:pPr>
+            <a:r>
+              <a:rPr lang="pt-BR" dirty="0"/>
+              <a:t>O desenvolvimento tradicional de software está muito burocrático e pouco flexível com as mudanças recorrentes no mercado;</a:t>
+            </a:r>
+          </a:p>
+          <a:p>
+            <a:pPr>
+              <a:buFont typeface="Wingdings" panose="05000000000000000000" pitchFamily="2" charset="2"/>
+              <a:buChar char="ü"/>
+            </a:pPr>
+            <a:r>
+              <a:rPr lang="pt-BR" dirty="0"/>
+              <a:t>Através dos ensinamentos do TPS podemos perceber que a produção enxuta fornece mais vantagens competitivas, e com a melhoria contínua o valor do produto tende a ser o melhor possível;</a:t>
+            </a:r>
+          </a:p>
+          <a:p>
+            <a:pPr>
+              <a:buFont typeface="Wingdings" panose="05000000000000000000" pitchFamily="2" charset="2"/>
+              <a:buChar char="ü"/>
+            </a:pPr>
+            <a:r>
+              <a:rPr lang="pt-BR" dirty="0"/>
+              <a:t>Startups são frutos de empreendedores que enxergarão oportunidades de negócio em um ambiente de extrema incerteza;</a:t>
+            </a:r>
+          </a:p>
+          <a:p>
+            <a:pPr>
+              <a:buFont typeface="Wingdings" panose="05000000000000000000" pitchFamily="2" charset="2"/>
+              <a:buChar char="ü"/>
+            </a:pPr>
+            <a:r>
+              <a:rPr lang="pt-BR" dirty="0"/>
+              <a:t>O manifesto ágil contribuiu na definição dos princípios para o desenvolvimento ágil de software com base nos conceitos de produção enxuta.</a:t>
+            </a:r>
+          </a:p>
+          <a:p>
+            <a:pPr>
+              <a:buFont typeface="Wingdings" panose="05000000000000000000" pitchFamily="2" charset="2"/>
+              <a:buChar char="ü"/>
+            </a:pPr>
+            <a:r>
+              <a:rPr lang="pt-BR" dirty="0"/>
+              <a:t>A  agilidade do Scrum é responsável, em grande parte, pela inovação apresentada. Tudo é feito a partir das necessidades dos clientes e não a partir de soluções pré-programadas;</a:t>
+            </a:r>
+            <a:endParaRPr lang="pt-BR" dirty="0"/>
           </a:p>
           <a:p>
             <a:pPr>
@@ -10448,23 +10185,7 @@
             </a:pPr>
             <a:r>
               <a:rPr lang="pt-BR" dirty="0"/>
-              <a:t>Concebido na década de 1950, quando </a:t>
-            </a:r>
-            <a:r>
-              <a:rPr lang="pt-BR" dirty="0" err="1"/>
-              <a:t>Toyoda</a:t>
-            </a:r>
-            <a:r>
-              <a:rPr lang="pt-BR" dirty="0"/>
-              <a:t> e </a:t>
-            </a:r>
-            <a:r>
-              <a:rPr lang="pt-BR" dirty="0" err="1"/>
-              <a:t>Ohno</a:t>
-            </a:r>
-            <a:r>
-              <a:rPr lang="pt-BR" dirty="0"/>
-              <a:t>, visitando os Estados Unidos, concluíram que o principal problema do modelo de Ford era o desperdício de recursos. Dessa observação nasceram os elementos básicos do Sistema Toyota de Produção, sendo também seus dois princípios mais importantes: </a:t>
+              <a:t>Concebido na década de 1950, quando Toyoda e Ohno, visitando os Estados Unidos, concluíram que o principal problema do modelo de Ford era o desperdício de recursos. Dessa observação nasceram os elementos básicos do Sistema Toyota de Produção, sendo também seus dois princípios mais importantes: </a:t>
             </a:r>
             <a:r>
               <a:rPr lang="pt-BR" b="1" dirty="0"/>
@@ -10617,10 +10338,9 @@
           <a:lstStyle/>
           <a:p>
             <a:r>
-              <a:rPr lang="pt-BR" dirty="0" err="1"/>
+              <a:rPr lang="pt-BR" dirty="0"/>
               <a:t>Heijunka</a:t>
             </a:r>
-            <a:endParaRPr lang="pt-BR" dirty="0"/>
           </a:p>
         </p:txBody>
       </p:sp>

</xml_diff>